<commit_message>
updated py import lesson
</commit_message>
<xml_diff>
--- a/en/PyProgrammingLessons/ImportingCustomLibraries.pptx
+++ b/en/PyProgrammingLessons/ImportingCustomLibraries.pptx
@@ -216,7 +216,7 @@
           <a:p>
             <a:fld id="{58040048-1E4D-CD41-AC49-0750EB72586B}" type="datetimeFigureOut">
               <a:rPr lang="en-US" smtClean="0"/>
-              <a:t>1/17/21</a:t>
+              <a:t>8/7/2021</a:t>
             </a:fld>
             <a:endParaRPr lang="en-US"/>
           </a:p>
@@ -382,7 +382,7 @@
           <a:p>
             <a:fld id="{2B8484CF-5098-F24E-8881-583515D5C406}" type="datetimeFigureOut">
               <a:rPr lang="en-US" smtClean="0"/>
-              <a:t>1/17/21</a:t>
+              <a:t>8/7/2021</a:t>
             </a:fld>
             <a:endParaRPr lang="en-US"/>
           </a:p>
@@ -1911,8 +1911,8 @@
           <a:lstStyle/>
           <a:p>
             <a:r>
-              <a:rPr lang="en-GB"/>
-              <a:t>Copyright © 2021 Prime Lessons (primelessons.org) CC-BY-NC-SA.  (Last edit: 01/17/2021)</a:t>
+              <a:rPr lang="en-US"/>
+              <a:t>Copyright © 2021 Prime Lessons (primelessons.org) CC-BY-NC-SA.  (Last edit: 08/07/2021)</a:t>
             </a:r>
             <a:endParaRPr lang="en-US" dirty="0"/>
           </a:p>
@@ -2165,8 +2165,8 @@
           <a:lstStyle/>
           <a:p>
             <a:r>
-              <a:rPr lang="en-GB"/>
-              <a:t>Copyright © 2021 Prime Lessons (primelessons.org) CC-BY-NC-SA.  (Last edit: 01/17/2021)</a:t>
+              <a:rPr lang="en-US"/>
+              <a:t>Copyright © 2021 Prime Lessons (primelessons.org) CC-BY-NC-SA.  (Last edit: 08/07/2021)</a:t>
             </a:r>
             <a:endParaRPr lang="en-US" dirty="0"/>
           </a:p>
@@ -2424,8 +2424,8 @@
           <a:lstStyle/>
           <a:p>
             <a:r>
-              <a:rPr lang="en-GB"/>
-              <a:t>Copyright © 2021 Prime Lessons (primelessons.org) CC-BY-NC-SA.  (Last edit: 01/17/2021)</a:t>
+              <a:rPr lang="en-US"/>
+              <a:t>Copyright © 2021 Prime Lessons (primelessons.org) CC-BY-NC-SA.  (Last edit: 08/07/2021)</a:t>
             </a:r>
             <a:endParaRPr lang="en-US" dirty="0"/>
           </a:p>
@@ -2940,8 +2940,8 @@
           <a:lstStyle/>
           <a:p>
             <a:r>
-              <a:rPr lang="en-GB"/>
-              <a:t>Copyright © 2021 Prime Lessons (primelessons.org) CC-BY-NC-SA.  (Last edit: 01/17/2021)</a:t>
+              <a:rPr lang="en-US"/>
+              <a:t>Copyright © 2021 Prime Lessons (primelessons.org) CC-BY-NC-SA.  (Last edit: 08/07/2021)</a:t>
             </a:r>
             <a:endParaRPr lang="en-US" dirty="0"/>
           </a:p>
@@ -3133,8 +3133,8 @@
           <a:lstStyle/>
           <a:p>
             <a:r>
-              <a:rPr lang="en-GB"/>
-              <a:t>Copyright © 2021 Prime Lessons (primelessons.org) CC-BY-NC-SA.  (Last edit: 01/17/2021)</a:t>
+              <a:rPr lang="en-US"/>
+              <a:t>Copyright © 2021 Prime Lessons (primelessons.org) CC-BY-NC-SA.  (Last edit: 08/07/2021)</a:t>
             </a:r>
             <a:endParaRPr lang="en-US" dirty="0"/>
           </a:p>
@@ -3536,8 +3536,8 @@
           <a:lstStyle/>
           <a:p>
             <a:r>
-              <a:rPr lang="en-GB"/>
-              <a:t>Copyright © 2021 Prime Lessons (primelessons.org) CC-BY-NC-SA.  (Last edit: 01/17/2021)</a:t>
+              <a:rPr lang="en-US"/>
+              <a:t>Copyright © 2021 Prime Lessons (primelessons.org) CC-BY-NC-SA.  (Last edit: 08/07/2021)</a:t>
             </a:r>
             <a:endParaRPr lang="en-US" dirty="0"/>
           </a:p>
@@ -3753,8 +3753,8 @@
           <a:lstStyle/>
           <a:p>
             <a:r>
-              <a:rPr lang="en-GB"/>
-              <a:t>Copyright © 2021 Prime Lessons (primelessons.org) CC-BY-NC-SA.  (Last edit: 01/17/2021)</a:t>
+              <a:rPr lang="en-US"/>
+              <a:t>Copyright © 2021 Prime Lessons (primelessons.org) CC-BY-NC-SA.  (Last edit: 08/07/2021)</a:t>
             </a:r>
             <a:endParaRPr lang="en-US" dirty="0"/>
           </a:p>
@@ -4267,8 +4267,8 @@
           <a:lstStyle/>
           <a:p>
             <a:r>
-              <a:rPr lang="en-GB"/>
-              <a:t>Copyright © 2021 Prime Lessons (primelessons.org) CC-BY-NC-SA.  (Last edit: 01/17/2021)</a:t>
+              <a:rPr lang="en-US"/>
+              <a:t>Copyright © 2021 Prime Lessons (primelessons.org) CC-BY-NC-SA.  (Last edit: 08/07/2021)</a:t>
             </a:r>
             <a:endParaRPr lang="en-US" dirty="0"/>
           </a:p>
@@ -4458,8 +4458,8 @@
           <a:lstStyle/>
           <a:p>
             <a:r>
-              <a:rPr lang="en-GB"/>
-              <a:t>Copyright © 2021 Prime Lessons (primelessons.org) CC-BY-NC-SA.  (Last edit: 01/17/2021)</a:t>
+              <a:rPr lang="en-US"/>
+              <a:t>Copyright © 2021 Prime Lessons (primelessons.org) CC-BY-NC-SA.  (Last edit: 08/07/2021)</a:t>
             </a:r>
             <a:endParaRPr lang="en-US" dirty="0"/>
           </a:p>
@@ -4857,8 +4857,8 @@
           <a:lstStyle/>
           <a:p>
             <a:r>
-              <a:rPr lang="en-GB"/>
-              <a:t>Copyright © 2021 Prime Lessons (primelessons.org) CC-BY-NC-SA.  (Last edit: 01/17/2021)</a:t>
+              <a:rPr lang="en-US"/>
+              <a:t>Copyright © 2021 Prime Lessons (primelessons.org) CC-BY-NC-SA.  (Last edit: 08/07/2021)</a:t>
             </a:r>
             <a:endParaRPr lang="en-US" dirty="0"/>
           </a:p>
@@ -5061,8 +5061,8 @@
           </a:lstStyle>
           <a:p>
             <a:r>
-              <a:rPr lang="en-GB"/>
-              <a:t>Copyright © 2021 Prime Lessons (primelessons.org) CC-BY-NC-SA.  (Last edit: 01/17/2021)</a:t>
+              <a:rPr lang="en-US"/>
+              <a:t>Copyright © 2021 Prime Lessons (primelessons.org) CC-BY-NC-SA.  (Last edit: 08/07/2021)</a:t>
             </a:r>
             <a:endParaRPr lang="en-US" dirty="0"/>
           </a:p>
@@ -5506,8 +5506,8 @@
           </a:lstStyle>
           <a:p>
             <a:r>
-              <a:rPr lang="en-GB"/>
-              <a:t>Copyright © 2021 Prime Lessons (primelessons.org) CC-BY-NC-SA.  (Last edit: 01/17/2021)</a:t>
+              <a:rPr lang="en-US"/>
+              <a:t>Copyright © 2021 Prime Lessons (primelessons.org) CC-BY-NC-SA.  (Last edit: 08/07/2021)</a:t>
             </a:r>
             <a:endParaRPr lang="en-US" dirty="0"/>
           </a:p>
@@ -6245,8 +6245,8 @@
           <a:lstStyle/>
           <a:p>
             <a:r>
-              <a:rPr lang="en-GB"/>
-              <a:t>Copyright © 2021 Prime Lessons (primelessons.org) CC-BY-NC-SA.  (Last edit: 01/17/2021)</a:t>
+              <a:rPr lang="en-US"/>
+              <a:t>Copyright © 2021 Prime Lessons (primelessons.org) CC-BY-NC-SA.  (Last edit: 08/07/2021)</a:t>
             </a:r>
             <a:endParaRPr lang="en-US" dirty="0"/>
           </a:p>
@@ -6936,8 +6936,8 @@
           <a:lstStyle/>
           <a:p>
             <a:r>
-              <a:rPr lang="en-GB"/>
-              <a:t>Copyright © 2021 Prime Lessons (primelessons.org) CC-BY-NC-SA.  (Last edit: 01/17/2021)</a:t>
+              <a:rPr lang="en-US"/>
+              <a:t>Copyright © 2021 Prime Lessons (primelessons.org) CC-BY-NC-SA.  (Last edit: 08/07/2021)</a:t>
             </a:r>
             <a:endParaRPr lang="en-US" dirty="0"/>
           </a:p>
@@ -7232,8 +7232,8 @@
           <a:lstStyle/>
           <a:p>
             <a:r>
-              <a:rPr lang="en-GB"/>
-              <a:t>Copyright © 2021 Prime Lessons (primelessons.org) CC-BY-NC-SA.  (Last edit: 01/17/2021)</a:t>
+              <a:rPr lang="en-US"/>
+              <a:t>Copyright © 2021 Prime Lessons (primelessons.org) CC-BY-NC-SA.  (Last edit: 08/07/2021)</a:t>
             </a:r>
             <a:endParaRPr lang="en-US" dirty="0"/>
           </a:p>
@@ -7809,8 +7809,8 @@
           <a:lstStyle/>
           <a:p>
             <a:r>
-              <a:rPr lang="en-GB"/>
-              <a:t>Copyright © 2021 Prime Lessons (primelessons.org) CC-BY-NC-SA.  (Last edit: 01/17/2021)</a:t>
+              <a:rPr lang="en-US"/>
+              <a:t>Copyright © 2021 Prime Lessons (primelessons.org) CC-BY-NC-SA.  (Last edit: 08/07/2021)</a:t>
             </a:r>
             <a:endParaRPr lang="en-US" dirty="0"/>
           </a:p>
@@ -8367,10 +8367,9 @@
           </a:lstStyle>
           <a:p>
             <a:r>
-              <a:rPr lang="en-GB"/>
-              <a:t>Copyright © 2021 Prime Lessons (primelessons.org) CC-BY-NC-SA.  (Last edit: 01/17/2021)</a:t>
-            </a:r>
-            <a:endParaRPr lang="en-US"/>
+              <a:rPr lang="en-US"/>
+              <a:t>Copyright © 2021 Prime Lessons (primelessons.org) CC-BY-NC-SA.  (Last edit: 08/07/2021)</a:t>
+            </a:r>
           </a:p>
         </p:txBody>
       </p:sp>
@@ -8669,8 +8668,8 @@
           <a:lstStyle/>
           <a:p>
             <a:r>
-              <a:rPr lang="en-GB"/>
-              <a:t>Copyright © 2021 Prime Lessons (primelessons.org) CC-BY-NC-SA.  (Last edit: 01/17/2021)</a:t>
+              <a:rPr lang="en-US"/>
+              <a:t>Copyright © 2021 Prime Lessons (primelessons.org) CC-BY-NC-SA.  (Last edit: 08/07/2021)</a:t>
             </a:r>
             <a:endParaRPr lang="en-US" dirty="0"/>
           </a:p>
@@ -8989,8 +8988,8 @@
           </a:lstStyle>
           <a:p>
             <a:r>
-              <a:rPr lang="en-GB"/>
-              <a:t>Copyright © 2021 Prime Lessons (primelessons.org) CC-BY-NC-SA.  (Last edit: 01/17/2021)</a:t>
+              <a:rPr lang="en-US"/>
+              <a:t>Copyright © 2021 Prime Lessons (primelessons.org) CC-BY-NC-SA.  (Last edit: 08/07/2021)</a:t>
             </a:r>
             <a:endParaRPr lang="en-US" dirty="0"/>
           </a:p>
@@ -9724,10 +9723,9 @@
           <a:lstStyle/>
           <a:p>
             <a:r>
-              <a:rPr lang="en-GB"/>
-              <a:t>Copyright © 2021 Prime Lessons (primelessons.org) CC-BY-NC-SA.  (Last edit: 01/17/2021)</a:t>
-            </a:r>
-            <a:endParaRPr lang="en-US"/>
+              <a:rPr lang="en-US"/>
+              <a:t>Copyright © 2021 Prime Lessons (primelessons.org) CC-BY-NC-SA.  (Last edit: 08/07/2021)</a:t>
+            </a:r>
           </a:p>
         </p:txBody>
       </p:sp>
@@ -9861,10 +9859,9 @@
           <a:lstStyle/>
           <a:p>
             <a:r>
-              <a:rPr lang="en-GB"/>
-              <a:t>Copyright © 2021 Prime Lessons (primelessons.org) CC-BY-NC-SA.  (Last edit: 01/17/2021)</a:t>
-            </a:r>
-            <a:endParaRPr lang="en-US"/>
+              <a:rPr lang="en-US"/>
+              <a:t>Copyright © 2021 Prime Lessons (primelessons.org) CC-BY-NC-SA.  (Last edit: 08/07/2021)</a:t>
+            </a:r>
           </a:p>
         </p:txBody>
       </p:sp>
@@ -10237,8 +10234,8 @@
           <a:lstStyle/>
           <a:p>
             <a:r>
-              <a:rPr lang="en-GB"/>
-              <a:t>Copyright © 2021 Prime Lessons (primelessons.org) CC-BY-NC-SA.  (Last edit: 01/17/2021)</a:t>
+              <a:rPr lang="en-US"/>
+              <a:t>Copyright © 2021 Prime Lessons (primelessons.org) CC-BY-NC-SA.  (Last edit: 08/07/2021)</a:t>
             </a:r>
             <a:endParaRPr lang="en-US" dirty="0"/>
           </a:p>
@@ -10350,7 +10347,7 @@
         <p:spPr/>
         <p:txBody>
           <a:bodyPr>
-            <a:normAutofit fontScale="70000" lnSpcReduction="20000"/>
+            <a:normAutofit fontScale="62500" lnSpcReduction="20000"/>
           </a:bodyPr>
           <a:lstStyle/>
           <a:p>
@@ -10363,10 +10360,25 @@
             <a:pPr marL="0" indent="0">
               <a:buNone/>
             </a:pPr>
-            <a:r>
+            <a:br>
+              <a:rPr lang="en-US" dirty="0">
+                <a:effectLst/>
+                <a:latin typeface="Menlo"/>
+              </a:rPr>
+            </a:br>
+            <a:br>
               <a:rPr lang="en-US" b="0" dirty="0">
                 <a:solidFill>
-                  <a:srgbClr val="0078CC"/>
+                  <a:srgbClr val="000000"/>
+                </a:solidFill>
+                <a:effectLst/>
+                <a:latin typeface="Consolas" panose="020B0609020204030204" pitchFamily="49" charset="0"/>
+              </a:rPr>
+            </a:br>
+            <a:r>
+              <a:rPr lang="en-US" b="0" dirty="0">
+                <a:solidFill>
+                  <a:srgbClr val="0000FF"/>
                 </a:solidFill>
                 <a:effectLst/>
                 <a:latin typeface="Consolas" panose="020B0609020204030204" pitchFamily="49" charset="0"/>
@@ -10386,72 +10398,62 @@
             <a:r>
               <a:rPr lang="en-US" b="0" dirty="0" err="1">
                 <a:solidFill>
+                  <a:srgbClr val="795E26"/>
+                </a:solidFill>
+                <a:effectLst/>
+                <a:latin typeface="Consolas" panose="020B0609020204030204" pitchFamily="49" charset="0"/>
+              </a:rPr>
+              <a:t>importFile</a:t>
+            </a:r>
+            <a:r>
+              <a:rPr lang="en-US" b="0" dirty="0">
+                <a:solidFill>
                   <a:srgbClr val="000000"/>
                 </a:solidFill>
                 <a:effectLst/>
                 <a:latin typeface="Consolas" panose="020B0609020204030204" pitchFamily="49" charset="0"/>
               </a:rPr>
-              <a:t>importFile</a:t>
+              <a:t>(</a:t>
+            </a:r>
+            <a:r>
+              <a:rPr lang="en-US" b="0" dirty="0" err="1">
+                <a:solidFill>
+                  <a:srgbClr val="001080"/>
+                </a:solidFill>
+                <a:effectLst/>
+                <a:latin typeface="Consolas" panose="020B0609020204030204" pitchFamily="49" charset="0"/>
+              </a:rPr>
+              <a:t>slotid</a:t>
             </a:r>
             <a:r>
               <a:rPr lang="en-US" b="0" dirty="0">
                 <a:solidFill>
-                  <a:srgbClr val="00877B"/>
-                </a:solidFill>
-                <a:effectLst/>
-                <a:latin typeface="Consolas" panose="020B0609020204030204" pitchFamily="49" charset="0"/>
-              </a:rPr>
-              <a:t>(</a:t>
-            </a:r>
-            <a:r>
-              <a:rPr lang="en-US" b="0" dirty="0" err="1">
-                <a:solidFill>
                   <a:srgbClr val="000000"/>
                 </a:solidFill>
                 <a:effectLst/>
                 <a:latin typeface="Consolas" panose="020B0609020204030204" pitchFamily="49" charset="0"/>
               </a:rPr>
-              <a:t>slotid</a:t>
+              <a:t>=</a:t>
             </a:r>
             <a:r>
               <a:rPr lang="en-US" b="0" dirty="0">
                 <a:solidFill>
+                  <a:srgbClr val="098658"/>
+                </a:solidFill>
+                <a:effectLst/>
+                <a:latin typeface="Consolas" panose="020B0609020204030204" pitchFamily="49" charset="0"/>
+              </a:rPr>
+              <a:t>0</a:t>
+            </a:r>
+            <a:r>
+              <a:rPr lang="en-US" b="0" dirty="0">
+                <a:solidFill>
                   <a:srgbClr val="000000"/>
                 </a:solidFill>
                 <a:effectLst/>
                 <a:latin typeface="Consolas" panose="020B0609020204030204" pitchFamily="49" charset="0"/>
               </a:rPr>
-              <a:t>=</a:t>
-            </a:r>
-            <a:r>
-              <a:rPr lang="en-US" b="0" dirty="0">
-                <a:solidFill>
-                  <a:srgbClr val="FF7D00"/>
-                </a:solidFill>
-                <a:effectLst/>
-                <a:latin typeface="Consolas" panose="020B0609020204030204" pitchFamily="49" charset="0"/>
-              </a:rPr>
-              <a:t>0</a:t>
-            </a:r>
-            <a:r>
-              <a:rPr lang="en-US" b="0" dirty="0">
-                <a:solidFill>
-                  <a:srgbClr val="00877B"/>
-                </a:solidFill>
-                <a:effectLst/>
-                <a:latin typeface="Consolas" panose="020B0609020204030204" pitchFamily="49" charset="0"/>
-              </a:rPr>
-              <a:t>)</a:t>
-            </a:r>
-            <a:r>
-              <a:rPr lang="en-US" b="0" dirty="0">
-                <a:solidFill>
-                  <a:srgbClr val="000000"/>
-                </a:solidFill>
-                <a:effectLst/>
-                <a:latin typeface="Consolas" panose="020B0609020204030204" pitchFamily="49" charset="0"/>
-              </a:rPr>
-              <a:t>:</a:t>
+              <a:t>):</a:t>
             </a:r>
           </a:p>
           <a:p>
@@ -10471,7 +10473,7 @@
             <a:r>
               <a:rPr lang="en-US" b="0" dirty="0">
                 <a:solidFill>
-                  <a:srgbClr val="0078CC"/>
+                  <a:srgbClr val="AF00DB"/>
                 </a:solidFill>
                 <a:effectLst/>
                 <a:latin typeface="Consolas" panose="020B0609020204030204" pitchFamily="49" charset="0"/>
@@ -10491,242 +10493,32 @@
             <a:r>
               <a:rPr lang="en-US" b="0" dirty="0" err="1">
                 <a:solidFill>
+                  <a:srgbClr val="267F99"/>
+                </a:solidFill>
+                <a:effectLst/>
+                <a:latin typeface="Consolas" panose="020B0609020204030204" pitchFamily="49" charset="0"/>
+              </a:rPr>
+              <a:t>os</a:t>
+            </a:r>
+            <a:r>
+              <a:rPr lang="en-US" b="0" dirty="0">
+                <a:solidFill>
                   <a:srgbClr val="000000"/>
                 </a:solidFill>
                 <a:effectLst/>
                 <a:latin typeface="Consolas" panose="020B0609020204030204" pitchFamily="49" charset="0"/>
               </a:rPr>
-              <a:t>os</a:t>
+              <a:t>, </a:t>
             </a:r>
             <a:r>
               <a:rPr lang="en-US" b="0" dirty="0">
                 <a:solidFill>
-                  <a:srgbClr val="000000"/>
-                </a:solidFill>
-                <a:effectLst/>
-                <a:latin typeface="Consolas" panose="020B0609020204030204" pitchFamily="49" charset="0"/>
-              </a:rPr>
-              <a:t>, sys</a:t>
-            </a:r>
-          </a:p>
-          <a:p>
-            <a:pPr marL="0" indent="0">
-              <a:buNone/>
-            </a:pPr>
-            <a:r>
-              <a:rPr lang="en-US" b="0" dirty="0">
-                <a:solidFill>
-                  <a:srgbClr val="000000"/>
-                </a:solidFill>
-                <a:effectLst/>
-                <a:latin typeface="Consolas" panose="020B0609020204030204" pitchFamily="49" charset="0"/>
-              </a:rPr>
-              <a:t>    </a:t>
-            </a:r>
-            <a:r>
-              <a:rPr lang="en-US" b="0" dirty="0">
-                <a:solidFill>
-                  <a:srgbClr val="0078CC"/>
-                </a:solidFill>
-                <a:effectLst/>
-                <a:latin typeface="Consolas" panose="020B0609020204030204" pitchFamily="49" charset="0"/>
-              </a:rPr>
-              <a:t>with</a:t>
-            </a:r>
-            <a:r>
-              <a:rPr lang="en-US" b="0" dirty="0">
-                <a:solidFill>
-                  <a:srgbClr val="000000"/>
-                </a:solidFill>
-                <a:effectLst/>
-                <a:latin typeface="Consolas" panose="020B0609020204030204" pitchFamily="49" charset="0"/>
-              </a:rPr>
-              <a:t> </a:t>
-            </a:r>
-            <a:r>
-              <a:rPr lang="en-US" b="0" dirty="0">
-                <a:solidFill>
-                  <a:srgbClr val="0078CC"/>
-                </a:solidFill>
-                <a:effectLst/>
-                <a:latin typeface="Consolas" panose="020B0609020204030204" pitchFamily="49" charset="0"/>
-              </a:rPr>
-              <a:t>open</a:t>
-            </a:r>
-            <a:r>
-              <a:rPr lang="en-US" b="0" dirty="0">
-                <a:solidFill>
-                  <a:srgbClr val="00877B"/>
-                </a:solidFill>
-                <a:effectLst/>
-                <a:latin typeface="Consolas" panose="020B0609020204030204" pitchFamily="49" charset="0"/>
-              </a:rPr>
-              <a:t>(</a:t>
-            </a:r>
-            <a:r>
-              <a:rPr lang="en-US" b="0" dirty="0">
-                <a:solidFill>
-                  <a:srgbClr val="D8009B"/>
-                </a:solidFill>
-                <a:effectLst/>
-                <a:latin typeface="Consolas" panose="020B0609020204030204" pitchFamily="49" charset="0"/>
-              </a:rPr>
-              <a:t>"/projects/.</a:t>
-            </a:r>
-            <a:r>
-              <a:rPr lang="en-US" b="0" dirty="0" err="1">
-                <a:solidFill>
-                  <a:srgbClr val="D8009B"/>
-                </a:solidFill>
-                <a:effectLst/>
-                <a:latin typeface="Consolas" panose="020B0609020204030204" pitchFamily="49" charset="0"/>
-              </a:rPr>
-              <a:t>slots"</a:t>
-            </a:r>
-            <a:r>
-              <a:rPr lang="en-US" b="0" dirty="0" err="1">
-                <a:solidFill>
-                  <a:srgbClr val="000000"/>
-                </a:solidFill>
-                <a:effectLst/>
-                <a:latin typeface="Consolas" panose="020B0609020204030204" pitchFamily="49" charset="0"/>
-              </a:rPr>
-              <a:t>,</a:t>
-            </a:r>
-            <a:r>
-              <a:rPr lang="en-US" b="0" dirty="0" err="1">
-                <a:solidFill>
-                  <a:srgbClr val="D8009B"/>
-                </a:solidFill>
-                <a:effectLst/>
-                <a:latin typeface="Consolas" panose="020B0609020204030204" pitchFamily="49" charset="0"/>
-              </a:rPr>
-              <a:t>"rt</a:t>
-            </a:r>
-            <a:r>
-              <a:rPr lang="en-US" b="0" dirty="0">
-                <a:solidFill>
-                  <a:srgbClr val="D8009B"/>
-                </a:solidFill>
-                <a:effectLst/>
-                <a:latin typeface="Consolas" panose="020B0609020204030204" pitchFamily="49" charset="0"/>
-              </a:rPr>
-              <a:t>"</a:t>
-            </a:r>
-            <a:r>
-              <a:rPr lang="en-US" b="0" dirty="0">
-                <a:solidFill>
-                  <a:srgbClr val="00877B"/>
-                </a:solidFill>
-                <a:effectLst/>
-                <a:latin typeface="Consolas" panose="020B0609020204030204" pitchFamily="49" charset="0"/>
-              </a:rPr>
-              <a:t>)</a:t>
-            </a:r>
-            <a:r>
-              <a:rPr lang="en-US" b="0" dirty="0">
-                <a:solidFill>
-                  <a:srgbClr val="000000"/>
-                </a:solidFill>
-                <a:effectLst/>
-                <a:latin typeface="Consolas" panose="020B0609020204030204" pitchFamily="49" charset="0"/>
-              </a:rPr>
-              <a:t> </a:t>
-            </a:r>
-            <a:r>
-              <a:rPr lang="en-US" b="0" dirty="0">
-                <a:solidFill>
-                  <a:srgbClr val="0078CC"/>
-                </a:solidFill>
-                <a:effectLst/>
-                <a:latin typeface="Consolas" panose="020B0609020204030204" pitchFamily="49" charset="0"/>
-              </a:rPr>
-              <a:t>as</a:t>
-            </a:r>
-            <a:r>
-              <a:rPr lang="en-US" b="0" dirty="0">
-                <a:solidFill>
-                  <a:srgbClr val="000000"/>
-                </a:solidFill>
-                <a:effectLst/>
-                <a:latin typeface="Consolas" panose="020B0609020204030204" pitchFamily="49" charset="0"/>
-              </a:rPr>
-              <a:t> f:</a:t>
-            </a:r>
-          </a:p>
-          <a:p>
-            <a:pPr marL="0" indent="0">
-              <a:buNone/>
-            </a:pPr>
-            <a:r>
-              <a:rPr lang="en-US" b="0" dirty="0">
-                <a:solidFill>
-                  <a:srgbClr val="000000"/>
-                </a:solidFill>
-                <a:effectLst/>
-                <a:latin typeface="Consolas" panose="020B0609020204030204" pitchFamily="49" charset="0"/>
-              </a:rPr>
-              <a:t>        slots = </a:t>
-            </a:r>
-            <a:r>
-              <a:rPr lang="en-US" b="0" dirty="0">
-                <a:solidFill>
-                  <a:srgbClr val="0078CC"/>
-                </a:solidFill>
-                <a:effectLst/>
-                <a:latin typeface="Consolas" panose="020B0609020204030204" pitchFamily="49" charset="0"/>
-              </a:rPr>
-              <a:t>eval</a:t>
-            </a:r>
-            <a:r>
-              <a:rPr lang="en-US" b="0" dirty="0">
-                <a:solidFill>
-                  <a:srgbClr val="00877B"/>
-                </a:solidFill>
-                <a:effectLst/>
-                <a:latin typeface="Consolas" panose="020B0609020204030204" pitchFamily="49" charset="0"/>
-              </a:rPr>
-              <a:t>(</a:t>
-            </a:r>
-            <a:r>
-              <a:rPr lang="en-US" b="0" dirty="0">
-                <a:solidFill>
-                  <a:srgbClr val="0078CC"/>
-                </a:solidFill>
-                <a:effectLst/>
-                <a:latin typeface="Consolas" panose="020B0609020204030204" pitchFamily="49" charset="0"/>
-              </a:rPr>
-              <a:t>str</a:t>
-            </a:r>
-            <a:r>
-              <a:rPr lang="en-US" b="0" dirty="0">
-                <a:solidFill>
-                  <a:srgbClr val="00877B"/>
-                </a:solidFill>
-                <a:effectLst/>
-                <a:latin typeface="Consolas" panose="020B0609020204030204" pitchFamily="49" charset="0"/>
-              </a:rPr>
-              <a:t>(</a:t>
-            </a:r>
-            <a:r>
-              <a:rPr lang="en-US" b="0" dirty="0" err="1">
-                <a:solidFill>
-                  <a:srgbClr val="000000"/>
-                </a:solidFill>
-                <a:effectLst/>
-                <a:latin typeface="Consolas" panose="020B0609020204030204" pitchFamily="49" charset="0"/>
-              </a:rPr>
-              <a:t>f.read</a:t>
-            </a:r>
-            <a:r>
-              <a:rPr lang="en-US" b="0" dirty="0">
-                <a:solidFill>
-                  <a:srgbClr val="00877B"/>
-                </a:solidFill>
-                <a:effectLst/>
-                <a:latin typeface="Consolas" panose="020B0609020204030204" pitchFamily="49" charset="0"/>
-              </a:rPr>
-              <a:t>()))</a:t>
+                  <a:srgbClr val="267F99"/>
+                </a:solidFill>
+                <a:effectLst/>
+                <a:latin typeface="Consolas" panose="020B0609020204030204" pitchFamily="49" charset="0"/>
+              </a:rPr>
+              <a:t>sys</a:t>
             </a:r>
             <a:endParaRPr lang="en-US" b="0" dirty="0">
               <a:solidFill>
@@ -10753,7 +10545,7 @@
             <a:r>
               <a:rPr lang="en-US" b="0" dirty="0">
                 <a:solidFill>
-                  <a:srgbClr val="0078CC"/>
+                  <a:srgbClr val="AF00DB"/>
                 </a:solidFill>
                 <a:effectLst/>
                 <a:latin typeface="Consolas" panose="020B0609020204030204" pitchFamily="49" charset="0"/>
@@ -10773,7 +10565,7 @@
             <a:r>
               <a:rPr lang="en-US" b="0" dirty="0">
                 <a:solidFill>
-                  <a:srgbClr val="0078CC"/>
+                  <a:srgbClr val="795E26"/>
                 </a:solidFill>
                 <a:effectLst/>
                 <a:latin typeface="Consolas" panose="020B0609020204030204" pitchFamily="49" charset="0"/>
@@ -10783,7 +10575,7 @@
             <a:r>
               <a:rPr lang="en-US" b="0" dirty="0">
                 <a:solidFill>
-                  <a:srgbClr val="00877B"/>
+                  <a:srgbClr val="000000"/>
                 </a:solidFill>
                 <a:effectLst/>
                 <a:latin typeface="Consolas" panose="020B0609020204030204" pitchFamily="49" charset="0"/>
@@ -10793,202 +10585,102 @@
             <a:r>
               <a:rPr lang="en-US" b="0" dirty="0">
                 <a:solidFill>
-                  <a:srgbClr val="D8009B"/>
-                </a:solidFill>
-                <a:effectLst/>
-                <a:latin typeface="Consolas" panose="020B0609020204030204" pitchFamily="49" charset="0"/>
-              </a:rPr>
-              <a:t>"/projects/"</a:t>
+                  <a:srgbClr val="A31515"/>
+                </a:solidFill>
+                <a:effectLst/>
+                <a:latin typeface="Consolas" panose="020B0609020204030204" pitchFamily="49" charset="0"/>
+              </a:rPr>
+              <a:t>"/projects/.</a:t>
+            </a:r>
+            <a:r>
+              <a:rPr lang="en-US" b="0" dirty="0" err="1">
+                <a:solidFill>
+                  <a:srgbClr val="A31515"/>
+                </a:solidFill>
+                <a:effectLst/>
+                <a:latin typeface="Consolas" panose="020B0609020204030204" pitchFamily="49" charset="0"/>
+              </a:rPr>
+              <a:t>slots"</a:t>
+            </a:r>
+            <a:r>
+              <a:rPr lang="en-US" b="0" dirty="0" err="1">
+                <a:solidFill>
+                  <a:srgbClr val="000000"/>
+                </a:solidFill>
+                <a:effectLst/>
+                <a:latin typeface="Consolas" panose="020B0609020204030204" pitchFamily="49" charset="0"/>
+              </a:rPr>
+              <a:t>,</a:t>
+            </a:r>
+            <a:r>
+              <a:rPr lang="en-US" b="0" dirty="0" err="1">
+                <a:solidFill>
+                  <a:srgbClr val="A31515"/>
+                </a:solidFill>
+                <a:effectLst/>
+                <a:latin typeface="Consolas" panose="020B0609020204030204" pitchFamily="49" charset="0"/>
+              </a:rPr>
+              <a:t>"rt</a:t>
             </a:r>
             <a:r>
               <a:rPr lang="en-US" b="0" dirty="0">
                 <a:solidFill>
+                  <a:srgbClr val="A31515"/>
+                </a:solidFill>
+                <a:effectLst/>
+                <a:latin typeface="Consolas" panose="020B0609020204030204" pitchFamily="49" charset="0"/>
+              </a:rPr>
+              <a:t>"</a:t>
+            </a:r>
+            <a:r>
+              <a:rPr lang="en-US" b="0" dirty="0">
+                <a:solidFill>
                   <a:srgbClr val="000000"/>
                 </a:solidFill>
                 <a:effectLst/>
                 <a:latin typeface="Consolas" panose="020B0609020204030204" pitchFamily="49" charset="0"/>
               </a:rPr>
-              <a:t>+</a:t>
+              <a:t>) </a:t>
             </a:r>
             <a:r>
               <a:rPr lang="en-US" b="0" dirty="0">
                 <a:solidFill>
-                  <a:srgbClr val="0078CC"/>
-                </a:solidFill>
-                <a:effectLst/>
-                <a:latin typeface="Consolas" panose="020B0609020204030204" pitchFamily="49" charset="0"/>
-              </a:rPr>
-              <a:t>str</a:t>
+                  <a:srgbClr val="AF00DB"/>
+                </a:solidFill>
+                <a:effectLst/>
+                <a:latin typeface="Consolas" panose="020B0609020204030204" pitchFamily="49" charset="0"/>
+              </a:rPr>
+              <a:t>as</a:t>
             </a:r>
             <a:r>
               <a:rPr lang="en-US" b="0" dirty="0">
                 <a:solidFill>
-                  <a:srgbClr val="00877B"/>
-                </a:solidFill>
-                <a:effectLst/>
-                <a:latin typeface="Consolas" panose="020B0609020204030204" pitchFamily="49" charset="0"/>
-              </a:rPr>
-              <a:t>(</a:t>
+                  <a:srgbClr val="000000"/>
+                </a:solidFill>
+                <a:effectLst/>
+                <a:latin typeface="Consolas" panose="020B0609020204030204" pitchFamily="49" charset="0"/>
+              </a:rPr>
+              <a:t> </a:t>
             </a:r>
             <a:r>
               <a:rPr lang="en-US" b="0" dirty="0">
                 <a:solidFill>
+                  <a:srgbClr val="001080"/>
+                </a:solidFill>
+                <a:effectLst/>
+                <a:latin typeface="Consolas" panose="020B0609020204030204" pitchFamily="49" charset="0"/>
+              </a:rPr>
+              <a:t>f</a:t>
+            </a:r>
+            <a:r>
+              <a:rPr lang="en-US" b="0" dirty="0">
+                <a:solidFill>
                   <a:srgbClr val="000000"/>
                 </a:solidFill>
                 <a:effectLst/>
                 <a:latin typeface="Consolas" panose="020B0609020204030204" pitchFamily="49" charset="0"/>
               </a:rPr>
-              <a:t>slots</a:t>
-            </a:r>
-            <a:r>
-              <a:rPr lang="en-US" b="0" dirty="0">
-                <a:solidFill>
-                  <a:srgbClr val="00877B"/>
-                </a:solidFill>
-                <a:effectLst/>
-                <a:latin typeface="Consolas" panose="020B0609020204030204" pitchFamily="49" charset="0"/>
-              </a:rPr>
-              <a:t>[</a:t>
-            </a:r>
-            <a:r>
-              <a:rPr lang="en-US" b="0" dirty="0" err="1">
-                <a:solidFill>
-                  <a:srgbClr val="000000"/>
-                </a:solidFill>
-                <a:effectLst/>
-                <a:latin typeface="Consolas" panose="020B0609020204030204" pitchFamily="49" charset="0"/>
-              </a:rPr>
-              <a:t>slotid</a:t>
-            </a:r>
-            <a:r>
-              <a:rPr lang="en-US" b="0" dirty="0">
-                <a:solidFill>
-                  <a:srgbClr val="00877B"/>
-                </a:solidFill>
-                <a:effectLst/>
-                <a:latin typeface="Consolas" panose="020B0609020204030204" pitchFamily="49" charset="0"/>
-              </a:rPr>
-              <a:t>][</a:t>
-            </a:r>
-            <a:r>
-              <a:rPr lang="en-US" b="0" dirty="0">
-                <a:solidFill>
-                  <a:srgbClr val="D8009B"/>
-                </a:solidFill>
-                <a:effectLst/>
-                <a:latin typeface="Consolas" panose="020B0609020204030204" pitchFamily="49" charset="0"/>
-              </a:rPr>
-              <a:t>"id"</a:t>
-            </a:r>
-            <a:r>
-              <a:rPr lang="en-US" b="0" dirty="0">
-                <a:solidFill>
-                  <a:srgbClr val="00877B"/>
-                </a:solidFill>
-                <a:effectLst/>
-                <a:latin typeface="Consolas" panose="020B0609020204030204" pitchFamily="49" charset="0"/>
-              </a:rPr>
-              <a:t>])</a:t>
-            </a:r>
-            <a:r>
-              <a:rPr lang="en-US" b="0" dirty="0">
-                <a:solidFill>
-                  <a:srgbClr val="000000"/>
-                </a:solidFill>
-                <a:effectLst/>
-                <a:latin typeface="Consolas" panose="020B0609020204030204" pitchFamily="49" charset="0"/>
-              </a:rPr>
-              <a:t>+</a:t>
-            </a:r>
-            <a:r>
-              <a:rPr lang="en-US" b="0" dirty="0">
-                <a:solidFill>
-                  <a:srgbClr val="D8009B"/>
-                </a:solidFill>
-                <a:effectLst/>
-                <a:latin typeface="Consolas" panose="020B0609020204030204" pitchFamily="49" charset="0"/>
-              </a:rPr>
-              <a:t>".</a:t>
-            </a:r>
-            <a:r>
-              <a:rPr lang="en-US" b="0" dirty="0" err="1">
-                <a:solidFill>
-                  <a:srgbClr val="D8009B"/>
-                </a:solidFill>
-                <a:effectLst/>
-                <a:latin typeface="Consolas" panose="020B0609020204030204" pitchFamily="49" charset="0"/>
-              </a:rPr>
-              <a:t>py</a:t>
-            </a:r>
-            <a:r>
-              <a:rPr lang="en-US" b="0" dirty="0">
-                <a:solidFill>
-                  <a:srgbClr val="D8009B"/>
-                </a:solidFill>
-                <a:effectLst/>
-                <a:latin typeface="Consolas" panose="020B0609020204030204" pitchFamily="49" charset="0"/>
-              </a:rPr>
-              <a:t>"</a:t>
-            </a:r>
-            <a:r>
-              <a:rPr lang="en-US" b="0" dirty="0">
-                <a:solidFill>
-                  <a:srgbClr val="000000"/>
-                </a:solidFill>
-                <a:effectLst/>
-                <a:latin typeface="Consolas" panose="020B0609020204030204" pitchFamily="49" charset="0"/>
-              </a:rPr>
-              <a:t>,</a:t>
-            </a:r>
-            <a:r>
-              <a:rPr lang="en-US" b="0" dirty="0">
-                <a:solidFill>
-                  <a:srgbClr val="D8009B"/>
-                </a:solidFill>
-                <a:effectLst/>
-                <a:latin typeface="Consolas" panose="020B0609020204030204" pitchFamily="49" charset="0"/>
-              </a:rPr>
-              <a:t>"rt"</a:t>
-            </a:r>
-            <a:r>
-              <a:rPr lang="en-US" b="0" dirty="0">
-                <a:solidFill>
-                  <a:srgbClr val="00877B"/>
-                </a:solidFill>
-                <a:effectLst/>
-                <a:latin typeface="Consolas" panose="020B0609020204030204" pitchFamily="49" charset="0"/>
-              </a:rPr>
-              <a:t>)</a:t>
-            </a:r>
-            <a:r>
-              <a:rPr lang="en-US" b="0" dirty="0">
-                <a:solidFill>
-                  <a:srgbClr val="000000"/>
-                </a:solidFill>
-                <a:effectLst/>
-                <a:latin typeface="Consolas" panose="020B0609020204030204" pitchFamily="49" charset="0"/>
-              </a:rPr>
-              <a:t> </a:t>
-            </a:r>
-            <a:r>
-              <a:rPr lang="en-US" b="0" dirty="0">
-                <a:solidFill>
-                  <a:srgbClr val="0078CC"/>
-                </a:solidFill>
-                <a:effectLst/>
-                <a:latin typeface="Consolas" panose="020B0609020204030204" pitchFamily="49" charset="0"/>
-              </a:rPr>
-              <a:t>as</a:t>
-            </a:r>
-            <a:r>
-              <a:rPr lang="en-US" b="0" dirty="0">
-                <a:solidFill>
-                  <a:srgbClr val="000000"/>
-                </a:solidFill>
-                <a:effectLst/>
-                <a:latin typeface="Consolas" panose="020B0609020204030204" pitchFamily="49" charset="0"/>
-              </a:rPr>
-              <a:t> f:</a:t>
+              <a:t>:</a:t>
             </a:r>
           </a:p>
           <a:p>
@@ -11003,27 +10695,667 @@
                 <a:effectLst/>
                 <a:latin typeface="Consolas" panose="020B0609020204030204" pitchFamily="49" charset="0"/>
               </a:rPr>
-              <a:t>        program = </a:t>
+              <a:t>        </a:t>
+            </a:r>
+            <a:r>
+              <a:rPr lang="en-US" b="0" dirty="0">
+                <a:solidFill>
+                  <a:srgbClr val="001080"/>
+                </a:solidFill>
+                <a:effectLst/>
+                <a:latin typeface="Consolas" panose="020B0609020204030204" pitchFamily="49" charset="0"/>
+              </a:rPr>
+              <a:t>slots</a:t>
+            </a:r>
+            <a:r>
+              <a:rPr lang="en-US" b="0" dirty="0">
+                <a:solidFill>
+                  <a:srgbClr val="000000"/>
+                </a:solidFill>
+                <a:effectLst/>
+                <a:latin typeface="Consolas" panose="020B0609020204030204" pitchFamily="49" charset="0"/>
+              </a:rPr>
+              <a:t> = </a:t>
+            </a:r>
+            <a:r>
+              <a:rPr lang="en-US" b="0" dirty="0">
+                <a:solidFill>
+                  <a:srgbClr val="795E26"/>
+                </a:solidFill>
+                <a:effectLst/>
+                <a:latin typeface="Consolas" panose="020B0609020204030204" pitchFamily="49" charset="0"/>
+              </a:rPr>
+              <a:t>eval</a:t>
+            </a:r>
+            <a:r>
+              <a:rPr lang="en-US" b="0" dirty="0">
+                <a:solidFill>
+                  <a:srgbClr val="000000"/>
+                </a:solidFill>
+                <a:effectLst/>
+                <a:latin typeface="Consolas" panose="020B0609020204030204" pitchFamily="49" charset="0"/>
+              </a:rPr>
+              <a:t>(</a:t>
+            </a:r>
+            <a:r>
+              <a:rPr lang="en-US" b="0" dirty="0">
+                <a:solidFill>
+                  <a:srgbClr val="267F99"/>
+                </a:solidFill>
+                <a:effectLst/>
+                <a:latin typeface="Consolas" panose="020B0609020204030204" pitchFamily="49" charset="0"/>
+              </a:rPr>
+              <a:t>str</a:t>
+            </a:r>
+            <a:r>
+              <a:rPr lang="en-US" b="0" dirty="0">
+                <a:solidFill>
+                  <a:srgbClr val="000000"/>
+                </a:solidFill>
+                <a:effectLst/>
+                <a:latin typeface="Consolas" panose="020B0609020204030204" pitchFamily="49" charset="0"/>
+              </a:rPr>
+              <a:t>(</a:t>
             </a:r>
             <a:r>
               <a:rPr lang="en-US" b="0" dirty="0" err="1">
                 <a:solidFill>
+                  <a:srgbClr val="001080"/>
+                </a:solidFill>
+                <a:effectLst/>
+                <a:latin typeface="Consolas" panose="020B0609020204030204" pitchFamily="49" charset="0"/>
+              </a:rPr>
+              <a:t>f</a:t>
+            </a:r>
+            <a:r>
+              <a:rPr lang="en-US" b="0" dirty="0" err="1">
+                <a:solidFill>
                   <a:srgbClr val="000000"/>
                 </a:solidFill>
                 <a:effectLst/>
                 <a:latin typeface="Consolas" panose="020B0609020204030204" pitchFamily="49" charset="0"/>
               </a:rPr>
-              <a:t>f.read</a:t>
+              <a:t>.</a:t>
+            </a:r>
+            <a:r>
+              <a:rPr lang="en-US" b="0" dirty="0" err="1">
+                <a:solidFill>
+                  <a:srgbClr val="795E26"/>
+                </a:solidFill>
+                <a:effectLst/>
+                <a:latin typeface="Consolas" panose="020B0609020204030204" pitchFamily="49" charset="0"/>
+              </a:rPr>
+              <a:t>read</a:t>
             </a:r>
             <a:r>
               <a:rPr lang="en-US" b="0" dirty="0">
                 <a:solidFill>
-                  <a:srgbClr val="00877B"/>
+                  <a:srgbClr val="000000"/>
+                </a:solidFill>
+                <a:effectLst/>
+                <a:latin typeface="Consolas" panose="020B0609020204030204" pitchFamily="49" charset="0"/>
+              </a:rPr>
+              <a:t>()))</a:t>
+            </a:r>
+          </a:p>
+          <a:p>
+            <a:pPr marL="0" indent="0">
+              <a:buNone/>
+            </a:pPr>
+            <a:r>
+              <a:rPr lang="en-US" b="0" dirty="0">
+                <a:solidFill>
+                  <a:srgbClr val="000000"/>
+                </a:solidFill>
+                <a:effectLst/>
+                <a:latin typeface="Consolas" panose="020B0609020204030204" pitchFamily="49" charset="0"/>
+              </a:rPr>
+              <a:t>    </a:t>
+            </a:r>
+            <a:r>
+              <a:rPr lang="en-US" b="0" dirty="0">
+                <a:solidFill>
+                  <a:srgbClr val="AF00DB"/>
+                </a:solidFill>
+                <a:effectLst/>
+                <a:latin typeface="Consolas" panose="020B0609020204030204" pitchFamily="49" charset="0"/>
+              </a:rPr>
+              <a:t>with</a:t>
+            </a:r>
+            <a:r>
+              <a:rPr lang="en-US" b="0" dirty="0">
+                <a:solidFill>
+                  <a:srgbClr val="000000"/>
+                </a:solidFill>
+                <a:effectLst/>
+                <a:latin typeface="Consolas" panose="020B0609020204030204" pitchFamily="49" charset="0"/>
+              </a:rPr>
+              <a:t> </a:t>
+            </a:r>
+            <a:r>
+              <a:rPr lang="en-US" b="0" dirty="0">
+                <a:solidFill>
+                  <a:srgbClr val="795E26"/>
+                </a:solidFill>
+                <a:effectLst/>
+                <a:latin typeface="Consolas" panose="020B0609020204030204" pitchFamily="49" charset="0"/>
+              </a:rPr>
+              <a:t>open</a:t>
+            </a:r>
+            <a:r>
+              <a:rPr lang="en-US" b="0" dirty="0">
+                <a:solidFill>
+                  <a:srgbClr val="000000"/>
+                </a:solidFill>
+                <a:effectLst/>
+                <a:latin typeface="Consolas" panose="020B0609020204030204" pitchFamily="49" charset="0"/>
+              </a:rPr>
+              <a:t>(</a:t>
+            </a:r>
+            <a:r>
+              <a:rPr lang="en-US" b="0" dirty="0">
+                <a:solidFill>
+                  <a:srgbClr val="A31515"/>
+                </a:solidFill>
+                <a:effectLst/>
+                <a:latin typeface="Consolas" panose="020B0609020204030204" pitchFamily="49" charset="0"/>
+              </a:rPr>
+              <a:t>"/projects/"</a:t>
+            </a:r>
+            <a:r>
+              <a:rPr lang="en-US" b="0" dirty="0">
+                <a:solidFill>
+                  <a:srgbClr val="000000"/>
+                </a:solidFill>
+                <a:effectLst/>
+                <a:latin typeface="Consolas" panose="020B0609020204030204" pitchFamily="49" charset="0"/>
+              </a:rPr>
+              <a:t>+</a:t>
+            </a:r>
+            <a:r>
+              <a:rPr lang="en-US" b="0" dirty="0">
+                <a:solidFill>
+                  <a:srgbClr val="267F99"/>
+                </a:solidFill>
+                <a:effectLst/>
+                <a:latin typeface="Consolas" panose="020B0609020204030204" pitchFamily="49" charset="0"/>
+              </a:rPr>
+              <a:t>str</a:t>
+            </a:r>
+            <a:r>
+              <a:rPr lang="en-US" b="0" dirty="0">
+                <a:solidFill>
+                  <a:srgbClr val="000000"/>
+                </a:solidFill>
+                <a:effectLst/>
+                <a:latin typeface="Consolas" panose="020B0609020204030204" pitchFamily="49" charset="0"/>
+              </a:rPr>
+              <a:t>(</a:t>
+            </a:r>
+            <a:r>
+              <a:rPr lang="en-US" b="0" dirty="0">
+                <a:solidFill>
+                  <a:srgbClr val="001080"/>
+                </a:solidFill>
+                <a:effectLst/>
+                <a:latin typeface="Consolas" panose="020B0609020204030204" pitchFamily="49" charset="0"/>
+              </a:rPr>
+              <a:t>slots</a:t>
+            </a:r>
+            <a:r>
+              <a:rPr lang="en-US" b="0" dirty="0">
+                <a:solidFill>
+                  <a:srgbClr val="000000"/>
+                </a:solidFill>
+                <a:effectLst/>
+                <a:latin typeface="Consolas" panose="020B0609020204030204" pitchFamily="49" charset="0"/>
+              </a:rPr>
+              <a:t>[</a:t>
+            </a:r>
+            <a:r>
+              <a:rPr lang="en-US" b="0" dirty="0" err="1">
+                <a:solidFill>
+                  <a:srgbClr val="001080"/>
+                </a:solidFill>
+                <a:effectLst/>
+                <a:latin typeface="Consolas" panose="020B0609020204030204" pitchFamily="49" charset="0"/>
+              </a:rPr>
+              <a:t>slotid</a:t>
+            </a:r>
+            <a:r>
+              <a:rPr lang="en-US" b="0" dirty="0">
+                <a:solidFill>
+                  <a:srgbClr val="000000"/>
+                </a:solidFill>
+                <a:effectLst/>
+                <a:latin typeface="Consolas" panose="020B0609020204030204" pitchFamily="49" charset="0"/>
+              </a:rPr>
+              <a:t>][</a:t>
+            </a:r>
+            <a:r>
+              <a:rPr lang="en-US" b="0" dirty="0">
+                <a:solidFill>
+                  <a:srgbClr val="A31515"/>
+                </a:solidFill>
+                <a:effectLst/>
+                <a:latin typeface="Consolas" panose="020B0609020204030204" pitchFamily="49" charset="0"/>
+              </a:rPr>
+              <a:t>"id"</a:t>
+            </a:r>
+            <a:r>
+              <a:rPr lang="en-US" b="0" dirty="0">
+                <a:solidFill>
+                  <a:srgbClr val="000000"/>
+                </a:solidFill>
+                <a:effectLst/>
+                <a:latin typeface="Consolas" panose="020B0609020204030204" pitchFamily="49" charset="0"/>
+              </a:rPr>
+              <a:t>])+</a:t>
+            </a:r>
+            <a:r>
+              <a:rPr lang="en-US" b="0" dirty="0">
+                <a:solidFill>
+                  <a:srgbClr val="A31515"/>
+                </a:solidFill>
+                <a:effectLst/>
+                <a:latin typeface="Consolas" panose="020B0609020204030204" pitchFamily="49" charset="0"/>
+              </a:rPr>
+              <a:t>"/__</a:t>
+            </a:r>
+            <a:r>
+              <a:rPr lang="en-US" b="0" dirty="0" err="1">
+                <a:solidFill>
+                  <a:srgbClr val="A31515"/>
+                </a:solidFill>
+                <a:effectLst/>
+                <a:latin typeface="Consolas" panose="020B0609020204030204" pitchFamily="49" charset="0"/>
+              </a:rPr>
+              <a:t>init</a:t>
+            </a:r>
+            <a:r>
+              <a:rPr lang="en-US" b="0" dirty="0">
+                <a:solidFill>
+                  <a:srgbClr val="A31515"/>
+                </a:solidFill>
+                <a:effectLst/>
+                <a:latin typeface="Consolas" panose="020B0609020204030204" pitchFamily="49" charset="0"/>
+              </a:rPr>
+              <a:t>__.</a:t>
+            </a:r>
+            <a:r>
+              <a:rPr lang="en-US" b="0" dirty="0" err="1">
+                <a:solidFill>
+                  <a:srgbClr val="A31515"/>
+                </a:solidFill>
+                <a:effectLst/>
+                <a:latin typeface="Consolas" panose="020B0609020204030204" pitchFamily="49" charset="0"/>
+              </a:rPr>
+              <a:t>mpy</a:t>
+            </a:r>
+            <a:r>
+              <a:rPr lang="en-US" b="0" dirty="0">
+                <a:solidFill>
+                  <a:srgbClr val="A31515"/>
+                </a:solidFill>
+                <a:effectLst/>
+                <a:latin typeface="Consolas" panose="020B0609020204030204" pitchFamily="49" charset="0"/>
+              </a:rPr>
+              <a:t>"</a:t>
+            </a:r>
+            <a:r>
+              <a:rPr lang="en-US" b="0" dirty="0">
+                <a:solidFill>
+                  <a:srgbClr val="000000"/>
+                </a:solidFill>
+                <a:effectLst/>
+                <a:latin typeface="Consolas" panose="020B0609020204030204" pitchFamily="49" charset="0"/>
+              </a:rPr>
+              <a:t>,</a:t>
+            </a:r>
+            <a:r>
+              <a:rPr lang="en-US" b="0" dirty="0">
+                <a:solidFill>
+                  <a:srgbClr val="A31515"/>
+                </a:solidFill>
+                <a:effectLst/>
+                <a:latin typeface="Consolas" panose="020B0609020204030204" pitchFamily="49" charset="0"/>
+              </a:rPr>
+              <a:t>"</a:t>
+            </a:r>
+            <a:r>
+              <a:rPr lang="en-US" b="0" dirty="0" err="1">
+                <a:solidFill>
+                  <a:srgbClr val="A31515"/>
+                </a:solidFill>
+                <a:effectLst/>
+                <a:latin typeface="Consolas" panose="020B0609020204030204" pitchFamily="49" charset="0"/>
+              </a:rPr>
+              <a:t>rb</a:t>
+            </a:r>
+            <a:r>
+              <a:rPr lang="en-US" b="0" dirty="0">
+                <a:solidFill>
+                  <a:srgbClr val="A31515"/>
+                </a:solidFill>
+                <a:effectLst/>
+                <a:latin typeface="Consolas" panose="020B0609020204030204" pitchFamily="49" charset="0"/>
+              </a:rPr>
+              <a:t>"</a:t>
+            </a:r>
+            <a:r>
+              <a:rPr lang="en-US" b="0" dirty="0">
+                <a:solidFill>
+                  <a:srgbClr val="000000"/>
+                </a:solidFill>
+                <a:effectLst/>
+                <a:latin typeface="Consolas" panose="020B0609020204030204" pitchFamily="49" charset="0"/>
+              </a:rPr>
+              <a:t>) </a:t>
+            </a:r>
+            <a:r>
+              <a:rPr lang="en-US" b="0" dirty="0">
+                <a:solidFill>
+                  <a:srgbClr val="AF00DB"/>
+                </a:solidFill>
+                <a:effectLst/>
+                <a:latin typeface="Consolas" panose="020B0609020204030204" pitchFamily="49" charset="0"/>
+              </a:rPr>
+              <a:t>as</a:t>
+            </a:r>
+            <a:r>
+              <a:rPr lang="en-US" b="0" dirty="0">
+                <a:solidFill>
+                  <a:srgbClr val="000000"/>
+                </a:solidFill>
+                <a:effectLst/>
+                <a:latin typeface="Consolas" panose="020B0609020204030204" pitchFamily="49" charset="0"/>
+              </a:rPr>
+              <a:t> </a:t>
+            </a:r>
+            <a:r>
+              <a:rPr lang="en-US" b="0" dirty="0">
+                <a:solidFill>
+                  <a:srgbClr val="001080"/>
+                </a:solidFill>
+                <a:effectLst/>
+                <a:latin typeface="Consolas" panose="020B0609020204030204" pitchFamily="49" charset="0"/>
+              </a:rPr>
+              <a:t>f</a:t>
+            </a:r>
+            <a:r>
+              <a:rPr lang="en-US" b="0" dirty="0">
+                <a:solidFill>
+                  <a:srgbClr val="000000"/>
+                </a:solidFill>
+                <a:effectLst/>
+                <a:latin typeface="Consolas" panose="020B0609020204030204" pitchFamily="49" charset="0"/>
+              </a:rPr>
+              <a:t>:</a:t>
+            </a:r>
+          </a:p>
+          <a:p>
+            <a:pPr marL="0" indent="0">
+              <a:buNone/>
+            </a:pPr>
+            <a:r>
+              <a:rPr lang="en-US" b="0" dirty="0">
+                <a:solidFill>
+                  <a:srgbClr val="000000"/>
+                </a:solidFill>
+                <a:effectLst/>
+                <a:latin typeface="Consolas" panose="020B0609020204030204" pitchFamily="49" charset="0"/>
+              </a:rPr>
+              <a:t>        </a:t>
+            </a:r>
+            <a:r>
+              <a:rPr lang="en-US" b="0" dirty="0">
+                <a:solidFill>
+                  <a:srgbClr val="001080"/>
+                </a:solidFill>
+                <a:effectLst/>
+                <a:latin typeface="Consolas" panose="020B0609020204030204" pitchFamily="49" charset="0"/>
+              </a:rPr>
+              <a:t>program</a:t>
+            </a:r>
+            <a:r>
+              <a:rPr lang="en-US" b="0" dirty="0">
+                <a:solidFill>
+                  <a:srgbClr val="000000"/>
+                </a:solidFill>
+                <a:effectLst/>
+                <a:latin typeface="Consolas" panose="020B0609020204030204" pitchFamily="49" charset="0"/>
+              </a:rPr>
+              <a:t> = </a:t>
+            </a:r>
+            <a:r>
+              <a:rPr lang="en-US" b="0" dirty="0" err="1">
+                <a:solidFill>
+                  <a:srgbClr val="001080"/>
+                </a:solidFill>
+                <a:effectLst/>
+                <a:latin typeface="Consolas" panose="020B0609020204030204" pitchFamily="49" charset="0"/>
+              </a:rPr>
+              <a:t>f</a:t>
+            </a:r>
+            <a:r>
+              <a:rPr lang="en-US" b="0" dirty="0" err="1">
+                <a:solidFill>
+                  <a:srgbClr val="000000"/>
+                </a:solidFill>
+                <a:effectLst/>
+                <a:latin typeface="Consolas" panose="020B0609020204030204" pitchFamily="49" charset="0"/>
+              </a:rPr>
+              <a:t>.</a:t>
+            </a:r>
+            <a:r>
+              <a:rPr lang="en-US" b="0" dirty="0" err="1">
+                <a:solidFill>
+                  <a:srgbClr val="795E26"/>
+                </a:solidFill>
+                <a:effectLst/>
+                <a:latin typeface="Consolas" panose="020B0609020204030204" pitchFamily="49" charset="0"/>
+              </a:rPr>
+              <a:t>read</a:t>
+            </a:r>
+            <a:r>
+              <a:rPr lang="en-US" b="0" dirty="0">
+                <a:solidFill>
+                  <a:srgbClr val="000000"/>
                 </a:solidFill>
                 <a:effectLst/>
                 <a:latin typeface="Consolas" panose="020B0609020204030204" pitchFamily="49" charset="0"/>
               </a:rPr>
               <a:t>()</a:t>
+            </a:r>
+          </a:p>
+          <a:p>
+            <a:pPr marL="0" indent="0">
+              <a:buNone/>
+            </a:pPr>
+            <a:r>
+              <a:rPr lang="en-US" b="0" dirty="0">
+                <a:solidFill>
+                  <a:srgbClr val="000000"/>
+                </a:solidFill>
+                <a:effectLst/>
+                <a:latin typeface="Consolas" panose="020B0609020204030204" pitchFamily="49" charset="0"/>
+              </a:rPr>
+              <a:t>    </a:t>
+            </a:r>
+            <a:r>
+              <a:rPr lang="en-US" b="0" dirty="0">
+                <a:solidFill>
+                  <a:srgbClr val="AF00DB"/>
+                </a:solidFill>
+                <a:effectLst/>
+                <a:latin typeface="Consolas" panose="020B0609020204030204" pitchFamily="49" charset="0"/>
+              </a:rPr>
+              <a:t>try</a:t>
+            </a:r>
+            <a:r>
+              <a:rPr lang="en-US" b="0" dirty="0">
+                <a:solidFill>
+                  <a:srgbClr val="000000"/>
+                </a:solidFill>
+                <a:effectLst/>
+                <a:latin typeface="Consolas" panose="020B0609020204030204" pitchFamily="49" charset="0"/>
+              </a:rPr>
+              <a:t>:</a:t>
+            </a:r>
+          </a:p>
+          <a:p>
+            <a:pPr marL="0" indent="0">
+              <a:buNone/>
+            </a:pPr>
+            <a:r>
+              <a:rPr lang="en-US" b="0" dirty="0">
+                <a:solidFill>
+                  <a:srgbClr val="000000"/>
+                </a:solidFill>
+                <a:effectLst/>
+                <a:latin typeface="Consolas" panose="020B0609020204030204" pitchFamily="49" charset="0"/>
+              </a:rPr>
+              <a:t>        </a:t>
+            </a:r>
+            <a:r>
+              <a:rPr lang="en-US" b="0" dirty="0" err="1">
+                <a:solidFill>
+                  <a:srgbClr val="267F99"/>
+                </a:solidFill>
+                <a:effectLst/>
+                <a:latin typeface="Consolas" panose="020B0609020204030204" pitchFamily="49" charset="0"/>
+              </a:rPr>
+              <a:t>os</a:t>
+            </a:r>
+            <a:r>
+              <a:rPr lang="en-US" b="0" dirty="0" err="1">
+                <a:solidFill>
+                  <a:srgbClr val="000000"/>
+                </a:solidFill>
+                <a:effectLst/>
+                <a:latin typeface="Consolas" panose="020B0609020204030204" pitchFamily="49" charset="0"/>
+              </a:rPr>
+              <a:t>.</a:t>
+            </a:r>
+            <a:r>
+              <a:rPr lang="en-US" b="0" dirty="0" err="1">
+                <a:solidFill>
+                  <a:srgbClr val="795E26"/>
+                </a:solidFill>
+                <a:effectLst/>
+                <a:latin typeface="Consolas" panose="020B0609020204030204" pitchFamily="49" charset="0"/>
+              </a:rPr>
+              <a:t>remove</a:t>
+            </a:r>
+            <a:r>
+              <a:rPr lang="en-US" b="0" dirty="0">
+                <a:solidFill>
+                  <a:srgbClr val="000000"/>
+                </a:solidFill>
+                <a:effectLst/>
+                <a:latin typeface="Consolas" panose="020B0609020204030204" pitchFamily="49" charset="0"/>
+              </a:rPr>
+              <a:t>(</a:t>
+            </a:r>
+            <a:r>
+              <a:rPr lang="en-US" b="0" dirty="0">
+                <a:solidFill>
+                  <a:srgbClr val="A31515"/>
+                </a:solidFill>
+                <a:effectLst/>
+                <a:latin typeface="Consolas" panose="020B0609020204030204" pitchFamily="49" charset="0"/>
+              </a:rPr>
+              <a:t>"/</a:t>
+            </a:r>
+            <a:r>
+              <a:rPr lang="en-US" b="0" dirty="0" err="1">
+                <a:solidFill>
+                  <a:srgbClr val="A31515"/>
+                </a:solidFill>
+                <a:effectLst/>
+                <a:latin typeface="Consolas" panose="020B0609020204030204" pitchFamily="49" charset="0"/>
+              </a:rPr>
+              <a:t>importFile.mpy</a:t>
+            </a:r>
+            <a:r>
+              <a:rPr lang="en-US" b="0" dirty="0">
+                <a:solidFill>
+                  <a:srgbClr val="A31515"/>
+                </a:solidFill>
+                <a:effectLst/>
+                <a:latin typeface="Consolas" panose="020B0609020204030204" pitchFamily="49" charset="0"/>
+              </a:rPr>
+              <a:t>"</a:t>
+            </a:r>
+            <a:r>
+              <a:rPr lang="en-US" b="0" dirty="0">
+                <a:solidFill>
+                  <a:srgbClr val="000000"/>
+                </a:solidFill>
+                <a:effectLst/>
+                <a:latin typeface="Consolas" panose="020B0609020204030204" pitchFamily="49" charset="0"/>
+              </a:rPr>
+              <a:t>)</a:t>
+            </a:r>
+          </a:p>
+          <a:p>
+            <a:pPr marL="0" indent="0">
+              <a:buNone/>
+            </a:pPr>
+            <a:r>
+              <a:rPr lang="en-US" b="0" dirty="0">
+                <a:solidFill>
+                  <a:srgbClr val="000000"/>
+                </a:solidFill>
+                <a:effectLst/>
+                <a:latin typeface="Consolas" panose="020B0609020204030204" pitchFamily="49" charset="0"/>
+              </a:rPr>
+              <a:t>    </a:t>
+            </a:r>
+            <a:r>
+              <a:rPr lang="en-US" b="0" dirty="0">
+                <a:solidFill>
+                  <a:srgbClr val="AF00DB"/>
+                </a:solidFill>
+                <a:effectLst/>
+                <a:latin typeface="Consolas" panose="020B0609020204030204" pitchFamily="49" charset="0"/>
+              </a:rPr>
+              <a:t>except</a:t>
+            </a:r>
+            <a:r>
+              <a:rPr lang="en-US" b="0" dirty="0">
+                <a:solidFill>
+                  <a:srgbClr val="000000"/>
+                </a:solidFill>
+                <a:effectLst/>
+                <a:latin typeface="Consolas" panose="020B0609020204030204" pitchFamily="49" charset="0"/>
+              </a:rPr>
+              <a:t>:</a:t>
+            </a:r>
+          </a:p>
+          <a:p>
+            <a:pPr marL="0" indent="0">
+              <a:buNone/>
+            </a:pPr>
+            <a:r>
+              <a:rPr lang="en-US" b="0" dirty="0">
+                <a:solidFill>
+                  <a:srgbClr val="000000"/>
+                </a:solidFill>
+                <a:effectLst/>
+                <a:latin typeface="Consolas" panose="020B0609020204030204" pitchFamily="49" charset="0"/>
+              </a:rPr>
+              <a:t>        </a:t>
+            </a:r>
+            <a:r>
+              <a:rPr lang="en-US" b="0" dirty="0">
+                <a:solidFill>
+                  <a:srgbClr val="AF00DB"/>
+                </a:solidFill>
+                <a:effectLst/>
+                <a:latin typeface="Consolas" panose="020B0609020204030204" pitchFamily="49" charset="0"/>
+              </a:rPr>
+              <a:t>pass</a:t>
             </a:r>
             <a:endParaRPr lang="en-US" b="0" dirty="0">
               <a:solidFill>
@@ -11050,12 +11382,132 @@
             <a:r>
               <a:rPr lang="en-US" b="0" dirty="0">
                 <a:solidFill>
-                  <a:srgbClr val="0078CC"/>
-                </a:solidFill>
-                <a:effectLst/>
-                <a:latin typeface="Consolas" panose="020B0609020204030204" pitchFamily="49" charset="0"/>
-              </a:rPr>
-              <a:t>try</a:t>
+                  <a:srgbClr val="AF00DB"/>
+                </a:solidFill>
+                <a:effectLst/>
+                <a:latin typeface="Consolas" panose="020B0609020204030204" pitchFamily="49" charset="0"/>
+              </a:rPr>
+              <a:t>with</a:t>
+            </a:r>
+            <a:r>
+              <a:rPr lang="en-US" b="0" dirty="0">
+                <a:solidFill>
+                  <a:srgbClr val="000000"/>
+                </a:solidFill>
+                <a:effectLst/>
+                <a:latin typeface="Consolas" panose="020B0609020204030204" pitchFamily="49" charset="0"/>
+              </a:rPr>
+              <a:t> </a:t>
+            </a:r>
+            <a:r>
+              <a:rPr lang="en-US" b="0" dirty="0">
+                <a:solidFill>
+                  <a:srgbClr val="795E26"/>
+                </a:solidFill>
+                <a:effectLst/>
+                <a:latin typeface="Consolas" panose="020B0609020204030204" pitchFamily="49" charset="0"/>
+              </a:rPr>
+              <a:t>open</a:t>
+            </a:r>
+            <a:r>
+              <a:rPr lang="en-US" b="0" dirty="0">
+                <a:solidFill>
+                  <a:srgbClr val="000000"/>
+                </a:solidFill>
+                <a:effectLst/>
+                <a:latin typeface="Consolas" panose="020B0609020204030204" pitchFamily="49" charset="0"/>
+              </a:rPr>
+              <a:t>(</a:t>
+            </a:r>
+            <a:r>
+              <a:rPr lang="en-US" b="0" dirty="0">
+                <a:solidFill>
+                  <a:srgbClr val="A31515"/>
+                </a:solidFill>
+                <a:effectLst/>
+                <a:latin typeface="Consolas" panose="020B0609020204030204" pitchFamily="49" charset="0"/>
+              </a:rPr>
+              <a:t>"/importFile.</a:t>
+            </a:r>
+            <a:r>
+              <a:rPr lang="en-US" b="0" dirty="0" err="1">
+                <a:solidFill>
+                  <a:srgbClr val="A31515"/>
+                </a:solidFill>
+                <a:effectLst/>
+                <a:latin typeface="Consolas" panose="020B0609020204030204" pitchFamily="49" charset="0"/>
+              </a:rPr>
+              <a:t>mpy</a:t>
+            </a:r>
+            <a:r>
+              <a:rPr lang="en-US" b="0" dirty="0">
+                <a:solidFill>
+                  <a:srgbClr val="A31515"/>
+                </a:solidFill>
+                <a:effectLst/>
+                <a:latin typeface="Consolas" panose="020B0609020204030204" pitchFamily="49" charset="0"/>
+              </a:rPr>
+              <a:t>"</a:t>
+            </a:r>
+            <a:r>
+              <a:rPr lang="en-US" b="0" dirty="0">
+                <a:solidFill>
+                  <a:srgbClr val="000000"/>
+                </a:solidFill>
+                <a:effectLst/>
+                <a:latin typeface="Consolas" panose="020B0609020204030204" pitchFamily="49" charset="0"/>
+              </a:rPr>
+              <a:t>,</a:t>
+            </a:r>
+            <a:r>
+              <a:rPr lang="en-US" b="0" dirty="0">
+                <a:solidFill>
+                  <a:srgbClr val="A31515"/>
+                </a:solidFill>
+                <a:effectLst/>
+                <a:latin typeface="Consolas" panose="020B0609020204030204" pitchFamily="49" charset="0"/>
+              </a:rPr>
+              <a:t>"w+"</a:t>
+            </a:r>
+            <a:r>
+              <a:rPr lang="en-US" b="0" dirty="0">
+                <a:solidFill>
+                  <a:srgbClr val="000000"/>
+                </a:solidFill>
+                <a:effectLst/>
+                <a:latin typeface="Consolas" panose="020B0609020204030204" pitchFamily="49" charset="0"/>
+              </a:rPr>
+              <a:t>) </a:t>
+            </a:r>
+            <a:r>
+              <a:rPr lang="en-US" b="0" dirty="0">
+                <a:solidFill>
+                  <a:srgbClr val="AF00DB"/>
+                </a:solidFill>
+                <a:effectLst/>
+                <a:latin typeface="Consolas" panose="020B0609020204030204" pitchFamily="49" charset="0"/>
+              </a:rPr>
+              <a:t>as</a:t>
+            </a:r>
+            <a:r>
+              <a:rPr lang="en-US" b="0" dirty="0">
+                <a:solidFill>
+                  <a:srgbClr val="000000"/>
+                </a:solidFill>
+                <a:effectLst/>
+                <a:latin typeface="Consolas" panose="020B0609020204030204" pitchFamily="49" charset="0"/>
+              </a:rPr>
+              <a:t> </a:t>
+            </a:r>
+            <a:r>
+              <a:rPr lang="en-US" b="0" dirty="0">
+                <a:solidFill>
+                  <a:srgbClr val="001080"/>
+                </a:solidFill>
+                <a:effectLst/>
+                <a:latin typeface="Consolas" panose="020B0609020204030204" pitchFamily="49" charset="0"/>
+              </a:rPr>
+              <a:t>f</a:t>
             </a:r>
             <a:r>
               <a:rPr lang="en-US" b="0" dirty="0">
@@ -11085,16 +11537,416 @@
             <a:r>
               <a:rPr lang="en-US" b="0" dirty="0" err="1">
                 <a:solidFill>
+                  <a:srgbClr val="001080"/>
+                </a:solidFill>
+                <a:effectLst/>
+                <a:latin typeface="Consolas" panose="020B0609020204030204" pitchFamily="49" charset="0"/>
+              </a:rPr>
+              <a:t>f</a:t>
+            </a:r>
+            <a:r>
+              <a:rPr lang="en-US" b="0" dirty="0" err="1">
+                <a:solidFill>
                   <a:srgbClr val="000000"/>
                 </a:solidFill>
                 <a:effectLst/>
                 <a:latin typeface="Consolas" panose="020B0609020204030204" pitchFamily="49" charset="0"/>
               </a:rPr>
-              <a:t>os.remove</a:t>
+              <a:t>.</a:t>
+            </a:r>
+            <a:r>
+              <a:rPr lang="en-US" b="0" dirty="0" err="1">
+                <a:solidFill>
+                  <a:srgbClr val="795E26"/>
+                </a:solidFill>
+                <a:effectLst/>
+                <a:latin typeface="Consolas" panose="020B0609020204030204" pitchFamily="49" charset="0"/>
+              </a:rPr>
+              <a:t>write</a:t>
             </a:r>
             <a:r>
               <a:rPr lang="en-US" b="0" dirty="0">
                 <a:solidFill>
+                  <a:srgbClr val="000000"/>
+                </a:solidFill>
+                <a:effectLst/>
+                <a:latin typeface="Consolas" panose="020B0609020204030204" pitchFamily="49" charset="0"/>
+              </a:rPr>
+              <a:t>(</a:t>
+            </a:r>
+            <a:r>
+              <a:rPr lang="en-US" b="0" dirty="0">
+                <a:solidFill>
+                  <a:srgbClr val="001080"/>
+                </a:solidFill>
+                <a:effectLst/>
+                <a:latin typeface="Consolas" panose="020B0609020204030204" pitchFamily="49" charset="0"/>
+              </a:rPr>
+              <a:t>program</a:t>
+            </a:r>
+            <a:r>
+              <a:rPr lang="en-US" b="0" dirty="0">
+                <a:solidFill>
+                  <a:srgbClr val="000000"/>
+                </a:solidFill>
+                <a:effectLst/>
+                <a:latin typeface="Consolas" panose="020B0609020204030204" pitchFamily="49" charset="0"/>
+              </a:rPr>
+              <a:t>)</a:t>
+            </a:r>
+          </a:p>
+          <a:p>
+            <a:pPr marL="0" indent="0">
+              <a:buNone/>
+            </a:pPr>
+            <a:r>
+              <a:rPr lang="en-US" b="0" dirty="0">
+                <a:solidFill>
+                  <a:srgbClr val="000000"/>
+                </a:solidFill>
+                <a:effectLst/>
+                <a:latin typeface="Consolas" panose="020B0609020204030204" pitchFamily="49" charset="0"/>
+              </a:rPr>
+              <a:t>    </a:t>
+            </a:r>
+            <a:r>
+              <a:rPr lang="en-US" b="0" dirty="0">
+                <a:solidFill>
+                  <a:srgbClr val="AF00DB"/>
+                </a:solidFill>
+                <a:effectLst/>
+                <a:latin typeface="Consolas" panose="020B0609020204030204" pitchFamily="49" charset="0"/>
+              </a:rPr>
+              <a:t>if</a:t>
+            </a:r>
+            <a:r>
+              <a:rPr lang="en-US" b="0" dirty="0">
+                <a:solidFill>
+                  <a:srgbClr val="000000"/>
+                </a:solidFill>
+                <a:effectLst/>
+                <a:latin typeface="Consolas" panose="020B0609020204030204" pitchFamily="49" charset="0"/>
+              </a:rPr>
+              <a:t> (</a:t>
+            </a:r>
+            <a:r>
+              <a:rPr lang="en-US" b="0" dirty="0">
+                <a:solidFill>
+                  <a:srgbClr val="A31515"/>
+                </a:solidFill>
+                <a:effectLst/>
+                <a:latin typeface="Consolas" panose="020B0609020204030204" pitchFamily="49" charset="0"/>
+              </a:rPr>
+              <a:t>"</a:t>
+            </a:r>
+            <a:r>
+              <a:rPr lang="en-US" b="0" dirty="0" err="1">
+                <a:solidFill>
+                  <a:srgbClr val="A31515"/>
+                </a:solidFill>
+                <a:effectLst/>
+                <a:latin typeface="Consolas" panose="020B0609020204030204" pitchFamily="49" charset="0"/>
+              </a:rPr>
+              <a:t>importFile</a:t>
+            </a:r>
+            <a:r>
+              <a:rPr lang="en-US" b="0" dirty="0">
+                <a:solidFill>
+                  <a:srgbClr val="A31515"/>
+                </a:solidFill>
+                <a:effectLst/>
+                <a:latin typeface="Consolas" panose="020B0609020204030204" pitchFamily="49" charset="0"/>
+              </a:rPr>
+              <a:t>"</a:t>
+            </a:r>
+            <a:r>
+              <a:rPr lang="en-US" b="0" dirty="0">
+                <a:solidFill>
+                  <a:srgbClr val="000000"/>
+                </a:solidFill>
+                <a:effectLst/>
+                <a:latin typeface="Consolas" panose="020B0609020204030204" pitchFamily="49" charset="0"/>
+              </a:rPr>
+              <a:t> </a:t>
+            </a:r>
+            <a:r>
+              <a:rPr lang="en-US" b="0" dirty="0">
+                <a:solidFill>
+                  <a:srgbClr val="0000FF"/>
+                </a:solidFill>
+                <a:effectLst/>
+                <a:latin typeface="Consolas" panose="020B0609020204030204" pitchFamily="49" charset="0"/>
+              </a:rPr>
+              <a:t>in</a:t>
+            </a:r>
+            <a:r>
+              <a:rPr lang="en-US" b="0" dirty="0">
+                <a:solidFill>
+                  <a:srgbClr val="000000"/>
+                </a:solidFill>
+                <a:effectLst/>
+                <a:latin typeface="Consolas" panose="020B0609020204030204" pitchFamily="49" charset="0"/>
+              </a:rPr>
+              <a:t> </a:t>
+            </a:r>
+            <a:r>
+              <a:rPr lang="en-US" b="0" dirty="0" err="1">
+                <a:solidFill>
+                  <a:srgbClr val="267F99"/>
+                </a:solidFill>
+                <a:effectLst/>
+                <a:latin typeface="Consolas" panose="020B0609020204030204" pitchFamily="49" charset="0"/>
+              </a:rPr>
+              <a:t>sys</a:t>
+            </a:r>
+            <a:r>
+              <a:rPr lang="en-US" b="0" dirty="0" err="1">
+                <a:solidFill>
+                  <a:srgbClr val="000000"/>
+                </a:solidFill>
+                <a:effectLst/>
+                <a:latin typeface="Consolas" panose="020B0609020204030204" pitchFamily="49" charset="0"/>
+              </a:rPr>
+              <a:t>.</a:t>
+            </a:r>
+            <a:r>
+              <a:rPr lang="en-US" b="0" dirty="0" err="1">
+                <a:solidFill>
+                  <a:srgbClr val="001080"/>
+                </a:solidFill>
+                <a:effectLst/>
+                <a:latin typeface="Consolas" panose="020B0609020204030204" pitchFamily="49" charset="0"/>
+              </a:rPr>
+              <a:t>modules</a:t>
+            </a:r>
+            <a:r>
+              <a:rPr lang="en-US" b="0" dirty="0">
+                <a:solidFill>
+                  <a:srgbClr val="000000"/>
+                </a:solidFill>
+                <a:effectLst/>
+                <a:latin typeface="Consolas" panose="020B0609020204030204" pitchFamily="49" charset="0"/>
+              </a:rPr>
+              <a:t>):</a:t>
+            </a:r>
+          </a:p>
+          <a:p>
+            <a:pPr marL="0" indent="0">
+              <a:buNone/>
+            </a:pPr>
+            <a:r>
+              <a:rPr lang="en-US" b="0" dirty="0">
+                <a:solidFill>
+                  <a:srgbClr val="000000"/>
+                </a:solidFill>
+                <a:effectLst/>
+                <a:latin typeface="Consolas" panose="020B0609020204030204" pitchFamily="49" charset="0"/>
+              </a:rPr>
+              <a:t>        </a:t>
+            </a:r>
+            <a:r>
+              <a:rPr lang="en-US" b="0" dirty="0">
+                <a:solidFill>
+                  <a:srgbClr val="AF00DB"/>
+                </a:solidFill>
+                <a:effectLst/>
+                <a:latin typeface="Consolas" panose="020B0609020204030204" pitchFamily="49" charset="0"/>
+              </a:rPr>
+              <a:t>del</a:t>
+            </a:r>
+            <a:r>
+              <a:rPr lang="en-US" b="0" dirty="0">
+                <a:solidFill>
+                  <a:srgbClr val="000000"/>
+                </a:solidFill>
+                <a:effectLst/>
+                <a:latin typeface="Consolas" panose="020B0609020204030204" pitchFamily="49" charset="0"/>
+              </a:rPr>
+              <a:t> </a:t>
+            </a:r>
+            <a:r>
+              <a:rPr lang="en-US" b="0" dirty="0" err="1">
+                <a:solidFill>
+                  <a:srgbClr val="267F99"/>
+                </a:solidFill>
+                <a:effectLst/>
+                <a:latin typeface="Consolas" panose="020B0609020204030204" pitchFamily="49" charset="0"/>
+              </a:rPr>
+              <a:t>sys</a:t>
+            </a:r>
+            <a:r>
+              <a:rPr lang="en-US" b="0" dirty="0" err="1">
+                <a:solidFill>
+                  <a:srgbClr val="000000"/>
+                </a:solidFill>
+                <a:effectLst/>
+                <a:latin typeface="Consolas" panose="020B0609020204030204" pitchFamily="49" charset="0"/>
+              </a:rPr>
+              <a:t>.</a:t>
+            </a:r>
+            <a:r>
+              <a:rPr lang="en-US" b="0" dirty="0" err="1">
+                <a:solidFill>
+                  <a:srgbClr val="001080"/>
+                </a:solidFill>
+                <a:effectLst/>
+                <a:latin typeface="Consolas" panose="020B0609020204030204" pitchFamily="49" charset="0"/>
+              </a:rPr>
+              <a:t>modules</a:t>
+            </a:r>
+            <a:r>
+              <a:rPr lang="en-US" b="0" dirty="0">
+                <a:solidFill>
+                  <a:srgbClr val="000000"/>
+                </a:solidFill>
+                <a:effectLst/>
+                <a:latin typeface="Consolas" panose="020B0609020204030204" pitchFamily="49" charset="0"/>
+              </a:rPr>
+              <a:t>[</a:t>
+            </a:r>
+            <a:r>
+              <a:rPr lang="en-US" b="0" dirty="0">
+                <a:solidFill>
+                  <a:srgbClr val="A31515"/>
+                </a:solidFill>
+                <a:effectLst/>
+                <a:latin typeface="Consolas" panose="020B0609020204030204" pitchFamily="49" charset="0"/>
+              </a:rPr>
+              <a:t>"</a:t>
+            </a:r>
+            <a:r>
+              <a:rPr lang="en-US" b="0" dirty="0" err="1">
+                <a:solidFill>
+                  <a:srgbClr val="A31515"/>
+                </a:solidFill>
+                <a:effectLst/>
+                <a:latin typeface="Consolas" panose="020B0609020204030204" pitchFamily="49" charset="0"/>
+              </a:rPr>
+              <a:t>importFile</a:t>
+            </a:r>
+            <a:r>
+              <a:rPr lang="en-US" b="0" dirty="0">
+                <a:solidFill>
+                  <a:srgbClr val="A31515"/>
+                </a:solidFill>
+                <a:effectLst/>
+                <a:latin typeface="Consolas" panose="020B0609020204030204" pitchFamily="49" charset="0"/>
+              </a:rPr>
+              <a:t>"</a:t>
+            </a:r>
+            <a:r>
+              <a:rPr lang="en-US" b="0" dirty="0">
+                <a:solidFill>
+                  <a:srgbClr val="000000"/>
+                </a:solidFill>
+                <a:effectLst/>
+                <a:latin typeface="Consolas" panose="020B0609020204030204" pitchFamily="49" charset="0"/>
+              </a:rPr>
+              <a:t>]</a:t>
+            </a:r>
+          </a:p>
+          <a:p>
+            <a:pPr marL="0" indent="0">
+              <a:buNone/>
+            </a:pPr>
+            <a:r>
+              <a:rPr lang="en-US" b="0" dirty="0">
+                <a:solidFill>
+                  <a:srgbClr val="000000"/>
+                </a:solidFill>
+                <a:effectLst/>
+                <a:latin typeface="Consolas" panose="020B0609020204030204" pitchFamily="49" charset="0"/>
+              </a:rPr>
+              <a:t>    </a:t>
+            </a:r>
+            <a:r>
+              <a:rPr lang="en-US" b="0" dirty="0">
+                <a:solidFill>
+                  <a:srgbClr val="795E26"/>
+                </a:solidFill>
+                <a:effectLst/>
+                <a:latin typeface="Consolas" panose="020B0609020204030204" pitchFamily="49" charset="0"/>
+              </a:rPr>
+              <a:t>exec</a:t>
+            </a:r>
+            <a:r>
+              <a:rPr lang="en-US" b="0" dirty="0">
+                <a:solidFill>
+                  <a:srgbClr val="000000"/>
+                </a:solidFill>
+                <a:effectLst/>
+                <a:latin typeface="Consolas" panose="020B0609020204030204" pitchFamily="49" charset="0"/>
+              </a:rPr>
+              <a:t>(</a:t>
+            </a:r>
+            <a:r>
+              <a:rPr lang="en-US" b="0" dirty="0">
+                <a:solidFill>
+                  <a:srgbClr val="A31515"/>
+                </a:solidFill>
+                <a:effectLst/>
+                <a:latin typeface="Consolas" panose="020B0609020204030204" pitchFamily="49" charset="0"/>
+              </a:rPr>
+              <a:t>"from </a:t>
+            </a:r>
+            <a:r>
+              <a:rPr lang="en-US" b="0" dirty="0" err="1">
+                <a:solidFill>
+                  <a:srgbClr val="A31515"/>
+                </a:solidFill>
+                <a:effectLst/>
+                <a:latin typeface="Consolas" panose="020B0609020204030204" pitchFamily="49" charset="0"/>
+              </a:rPr>
+              <a:t>importFile</a:t>
+            </a:r>
+            <a:r>
+              <a:rPr lang="en-US" b="0" dirty="0">
+                <a:solidFill>
+                  <a:srgbClr val="A31515"/>
+                </a:solidFill>
+                <a:effectLst/>
+                <a:latin typeface="Consolas" panose="020B0609020204030204" pitchFamily="49" charset="0"/>
+              </a:rPr>
+              <a:t> import *"</a:t>
+            </a:r>
+            <a:r>
+              <a:rPr lang="en-US" b="0" dirty="0">
+                <a:solidFill>
+                  <a:srgbClr val="000000"/>
+                </a:solidFill>
+                <a:effectLst/>
+                <a:latin typeface="Consolas" panose="020B0609020204030204" pitchFamily="49" charset="0"/>
+              </a:rPr>
+              <a:t>)</a:t>
+            </a:r>
+            <a:endParaRPr lang="en-US" dirty="0">
+              <a:solidFill>
+                <a:schemeClr val="tx1"/>
+              </a:solidFill>
+            </a:endParaRPr>
+          </a:p>
+          <a:p>
+            <a:r>
+              <a:rPr lang="en-US" dirty="0">
+                <a:solidFill>
+                  <a:schemeClr val="tx1"/>
+                </a:solidFill>
+              </a:rPr>
+              <a:t>If you type </a:t>
+            </a:r>
+            <a:r>
+              <a:rPr lang="en-US" b="0" dirty="0" err="1">
+                <a:solidFill>
+                  <a:srgbClr val="000000"/>
+                </a:solidFill>
+                <a:effectLst/>
+                <a:latin typeface="Consolas" panose="020B0609020204030204" pitchFamily="49" charset="0"/>
+              </a:rPr>
+              <a:t>importFile</a:t>
+            </a:r>
+            <a:r>
+              <a:rPr lang="en-US" b="0" dirty="0">
+                <a:solidFill>
                   <a:srgbClr val="00877B"/>
                 </a:solidFill>
                 <a:effectLst/>
@@ -11103,24 +11955,122 @@
               <a:t>(</a:t>
             </a:r>
             <a:r>
+              <a:rPr lang="en-US" b="0" dirty="0" err="1">
+                <a:solidFill>
+                  <a:srgbClr val="000000"/>
+                </a:solidFill>
+                <a:effectLst/>
+                <a:latin typeface="Consolas" panose="020B0609020204030204" pitchFamily="49" charset="0"/>
+              </a:rPr>
+              <a:t>slotid</a:t>
+            </a:r>
+            <a:r>
               <a:rPr lang="en-US" b="0" dirty="0">
                 <a:solidFill>
-                  <a:srgbClr val="D8009B"/>
-                </a:solidFill>
-                <a:effectLst/>
-                <a:latin typeface="Consolas" panose="020B0609020204030204" pitchFamily="49" charset="0"/>
-              </a:rPr>
-              <a:t>"/importFile.py"</a:t>
+                  <a:srgbClr val="000000"/>
+                </a:solidFill>
+                <a:effectLst/>
+                <a:latin typeface="Consolas" panose="020B0609020204030204" pitchFamily="49" charset="0"/>
+              </a:rPr>
+              <a:t>=</a:t>
             </a:r>
             <a:r>
               <a:rPr lang="en-US" b="0" dirty="0">
                 <a:solidFill>
+                  <a:srgbClr val="FF7D00"/>
+                </a:solidFill>
+                <a:effectLst/>
+                <a:latin typeface="Consolas" panose="020B0609020204030204" pitchFamily="49" charset="0"/>
+              </a:rPr>
+              <a:t>XXX</a:t>
+            </a:r>
+            <a:r>
+              <a:rPr lang="en-US" b="0" dirty="0">
+                <a:solidFill>
                   <a:srgbClr val="00877B"/>
                 </a:solidFill>
                 <a:effectLst/>
                 <a:latin typeface="Consolas" panose="020B0609020204030204" pitchFamily="49" charset="0"/>
               </a:rPr>
               <a:t>)</a:t>
+            </a:r>
+            <a:r>
+              <a:rPr lang="en-US" dirty="0">
+                <a:solidFill>
+                  <a:srgbClr val="000000"/>
+                </a:solidFill>
+              </a:rPr>
+              <a:t> and type the slot that you saved the other project to, your functions from the other project will be imported into this project.</a:t>
+            </a:r>
+          </a:p>
+          <a:p>
+            <a:r>
+              <a:rPr lang="en-US" b="0" dirty="0">
+                <a:solidFill>
+                  <a:srgbClr val="000000"/>
+                </a:solidFill>
+                <a:effectLst/>
+              </a:rPr>
+              <a:t>If you try running </a:t>
+            </a:r>
+            <a:r>
+              <a:rPr lang="en-US" b="0" dirty="0">
+                <a:solidFill>
+                  <a:srgbClr val="000000"/>
+                </a:solidFill>
+                <a:effectLst/>
+                <a:latin typeface="Consolas" panose="020B0609020204030204" pitchFamily="49" charset="0"/>
+              </a:rPr>
+              <a:t>left</a:t>
+            </a:r>
+            <a:r>
+              <a:rPr lang="en-US" b="0" dirty="0">
+                <a:solidFill>
+                  <a:srgbClr val="00877B"/>
+                </a:solidFill>
+                <a:effectLst/>
+                <a:latin typeface="Consolas" panose="020B0609020204030204" pitchFamily="49" charset="0"/>
+              </a:rPr>
+              <a:t>() </a:t>
+            </a:r>
+            <a:r>
+              <a:rPr lang="en-US" b="0" dirty="0">
+                <a:solidFill>
+                  <a:schemeClr val="tx1"/>
+                </a:solidFill>
+                <a:effectLst/>
+                <a:latin typeface="+mj-lt"/>
+              </a:rPr>
+              <a:t>or </a:t>
+            </a:r>
+            <a:r>
+              <a:rPr lang="en-US" b="0" dirty="0">
+                <a:solidFill>
+                  <a:srgbClr val="000000"/>
+                </a:solidFill>
+                <a:effectLst/>
+                <a:latin typeface="Consolas" panose="020B0609020204030204" pitchFamily="49" charset="0"/>
+              </a:rPr>
+              <a:t>right</a:t>
+            </a:r>
+            <a:r>
+              <a:rPr lang="en-US" b="0" dirty="0">
+                <a:solidFill>
+                  <a:srgbClr val="00877B"/>
+                </a:solidFill>
+                <a:effectLst/>
+                <a:latin typeface="Consolas" panose="020B0609020204030204" pitchFamily="49" charset="0"/>
+              </a:rPr>
+              <a:t>()</a:t>
+            </a:r>
+            <a:r>
+              <a:rPr lang="en-US" b="0" dirty="0">
+                <a:solidFill>
+                  <a:schemeClr val="tx1"/>
+                </a:solidFill>
+                <a:effectLst/>
+              </a:rPr>
+              <a:t>, the code should work properly.</a:t>
             </a:r>
             <a:endParaRPr lang="en-US" b="0" dirty="0">
               <a:solidFill>
@@ -11130,754 +12080,6 @@
               <a:latin typeface="Consolas" panose="020B0609020204030204" pitchFamily="49" charset="0"/>
             </a:endParaRPr>
           </a:p>
-          <a:p>
-            <a:pPr marL="0" indent="0">
-              <a:buNone/>
-            </a:pPr>
-            <a:r>
-              <a:rPr lang="en-US" b="0" dirty="0">
-                <a:solidFill>
-                  <a:srgbClr val="000000"/>
-                </a:solidFill>
-                <a:effectLst/>
-                <a:latin typeface="Consolas" panose="020B0609020204030204" pitchFamily="49" charset="0"/>
-              </a:rPr>
-              <a:t>    </a:t>
-            </a:r>
-            <a:r>
-              <a:rPr lang="en-US" b="0" dirty="0">
-                <a:solidFill>
-                  <a:srgbClr val="0078CC"/>
-                </a:solidFill>
-                <a:effectLst/>
-                <a:latin typeface="Consolas" panose="020B0609020204030204" pitchFamily="49" charset="0"/>
-              </a:rPr>
-              <a:t>except</a:t>
-            </a:r>
-            <a:r>
-              <a:rPr lang="en-US" b="0" dirty="0">
-                <a:solidFill>
-                  <a:srgbClr val="000000"/>
-                </a:solidFill>
-                <a:effectLst/>
-                <a:latin typeface="Consolas" panose="020B0609020204030204" pitchFamily="49" charset="0"/>
-              </a:rPr>
-              <a:t>:</a:t>
-            </a:r>
-          </a:p>
-          <a:p>
-            <a:pPr marL="0" indent="0">
-              <a:buNone/>
-            </a:pPr>
-            <a:r>
-              <a:rPr lang="en-US" b="0" dirty="0">
-                <a:solidFill>
-                  <a:srgbClr val="000000"/>
-                </a:solidFill>
-                <a:effectLst/>
-                <a:latin typeface="Consolas" panose="020B0609020204030204" pitchFamily="49" charset="0"/>
-              </a:rPr>
-              <a:t>        </a:t>
-            </a:r>
-            <a:r>
-              <a:rPr lang="en-US" b="0" dirty="0">
-                <a:solidFill>
-                  <a:srgbClr val="0078CC"/>
-                </a:solidFill>
-                <a:effectLst/>
-                <a:latin typeface="Consolas" panose="020B0609020204030204" pitchFamily="49" charset="0"/>
-              </a:rPr>
-              <a:t>pass</a:t>
-            </a:r>
-            <a:endParaRPr lang="en-US" b="0" dirty="0">
-              <a:solidFill>
-                <a:srgbClr val="000000"/>
-              </a:solidFill>
-              <a:effectLst/>
-              <a:latin typeface="Consolas" panose="020B0609020204030204" pitchFamily="49" charset="0"/>
-            </a:endParaRPr>
-          </a:p>
-          <a:p>
-            <a:pPr marL="0" indent="0">
-              <a:buNone/>
-            </a:pPr>
-            <a:r>
-              <a:rPr lang="en-US" b="0" dirty="0">
-                <a:solidFill>
-                  <a:srgbClr val="000000"/>
-                </a:solidFill>
-                <a:effectLst/>
-                <a:latin typeface="Consolas" panose="020B0609020204030204" pitchFamily="49" charset="0"/>
-              </a:rPr>
-              <a:t>    </a:t>
-            </a:r>
-            <a:r>
-              <a:rPr lang="en-US" b="0" dirty="0">
-                <a:solidFill>
-                  <a:srgbClr val="0078CC"/>
-                </a:solidFill>
-                <a:effectLst/>
-                <a:latin typeface="Consolas" panose="020B0609020204030204" pitchFamily="49" charset="0"/>
-              </a:rPr>
-              <a:t>with</a:t>
-            </a:r>
-            <a:r>
-              <a:rPr lang="en-US" b="0" dirty="0">
-                <a:solidFill>
-                  <a:srgbClr val="000000"/>
-                </a:solidFill>
-                <a:effectLst/>
-                <a:latin typeface="Consolas" panose="020B0609020204030204" pitchFamily="49" charset="0"/>
-              </a:rPr>
-              <a:t> </a:t>
-            </a:r>
-            <a:r>
-              <a:rPr lang="en-US" b="0" dirty="0">
-                <a:solidFill>
-                  <a:srgbClr val="0078CC"/>
-                </a:solidFill>
-                <a:effectLst/>
-                <a:latin typeface="Consolas" panose="020B0609020204030204" pitchFamily="49" charset="0"/>
-              </a:rPr>
-              <a:t>open</a:t>
-            </a:r>
-            <a:r>
-              <a:rPr lang="en-US" b="0" dirty="0">
-                <a:solidFill>
-                  <a:srgbClr val="00877B"/>
-                </a:solidFill>
-                <a:effectLst/>
-                <a:latin typeface="Consolas" panose="020B0609020204030204" pitchFamily="49" charset="0"/>
-              </a:rPr>
-              <a:t>(</a:t>
-            </a:r>
-            <a:r>
-              <a:rPr lang="en-US" b="0" dirty="0">
-                <a:solidFill>
-                  <a:srgbClr val="D8009B"/>
-                </a:solidFill>
-                <a:effectLst/>
-                <a:latin typeface="Consolas" panose="020B0609020204030204" pitchFamily="49" charset="0"/>
-              </a:rPr>
-              <a:t>"/importFile.</a:t>
-            </a:r>
-            <a:r>
-              <a:rPr lang="en-US" b="0" dirty="0" err="1">
-                <a:solidFill>
-                  <a:srgbClr val="D8009B"/>
-                </a:solidFill>
-                <a:effectLst/>
-                <a:latin typeface="Consolas" panose="020B0609020204030204" pitchFamily="49" charset="0"/>
-              </a:rPr>
-              <a:t>py</a:t>
-            </a:r>
-            <a:r>
-              <a:rPr lang="en-US" b="0" dirty="0">
-                <a:solidFill>
-                  <a:srgbClr val="D8009B"/>
-                </a:solidFill>
-                <a:effectLst/>
-                <a:latin typeface="Consolas" panose="020B0609020204030204" pitchFamily="49" charset="0"/>
-              </a:rPr>
-              <a:t>"</a:t>
-            </a:r>
-            <a:r>
-              <a:rPr lang="en-US" b="0" dirty="0">
-                <a:solidFill>
-                  <a:srgbClr val="000000"/>
-                </a:solidFill>
-                <a:effectLst/>
-                <a:latin typeface="Consolas" panose="020B0609020204030204" pitchFamily="49" charset="0"/>
-              </a:rPr>
-              <a:t>,</a:t>
-            </a:r>
-            <a:r>
-              <a:rPr lang="en-US" b="0" dirty="0">
-                <a:solidFill>
-                  <a:srgbClr val="D8009B"/>
-                </a:solidFill>
-                <a:effectLst/>
-                <a:latin typeface="Consolas" panose="020B0609020204030204" pitchFamily="49" charset="0"/>
-              </a:rPr>
-              <a:t>"w+"</a:t>
-            </a:r>
-            <a:r>
-              <a:rPr lang="en-US" b="0" dirty="0">
-                <a:solidFill>
-                  <a:srgbClr val="00877B"/>
-                </a:solidFill>
-                <a:effectLst/>
-                <a:latin typeface="Consolas" panose="020B0609020204030204" pitchFamily="49" charset="0"/>
-              </a:rPr>
-              <a:t>)</a:t>
-            </a:r>
-            <a:r>
-              <a:rPr lang="en-US" b="0" dirty="0">
-                <a:solidFill>
-                  <a:srgbClr val="000000"/>
-                </a:solidFill>
-                <a:effectLst/>
-                <a:latin typeface="Consolas" panose="020B0609020204030204" pitchFamily="49" charset="0"/>
-              </a:rPr>
-              <a:t> </a:t>
-            </a:r>
-            <a:r>
-              <a:rPr lang="en-US" b="0" dirty="0">
-                <a:solidFill>
-                  <a:srgbClr val="0078CC"/>
-                </a:solidFill>
-                <a:effectLst/>
-                <a:latin typeface="Consolas" panose="020B0609020204030204" pitchFamily="49" charset="0"/>
-              </a:rPr>
-              <a:t>as</a:t>
-            </a:r>
-            <a:r>
-              <a:rPr lang="en-US" b="0" dirty="0">
-                <a:solidFill>
-                  <a:srgbClr val="000000"/>
-                </a:solidFill>
-                <a:effectLst/>
-                <a:latin typeface="Consolas" panose="020B0609020204030204" pitchFamily="49" charset="0"/>
-              </a:rPr>
-              <a:t> f:</a:t>
-            </a:r>
-          </a:p>
-          <a:p>
-            <a:pPr marL="0" indent="0">
-              <a:buNone/>
-            </a:pPr>
-            <a:r>
-              <a:rPr lang="en-US" b="0" dirty="0">
-                <a:solidFill>
-                  <a:srgbClr val="000000"/>
-                </a:solidFill>
-                <a:effectLst/>
-                <a:latin typeface="Consolas" panose="020B0609020204030204" pitchFamily="49" charset="0"/>
-              </a:rPr>
-              <a:t>        </a:t>
-            </a:r>
-            <a:r>
-              <a:rPr lang="en-US" b="0" dirty="0" err="1">
-                <a:solidFill>
-                  <a:srgbClr val="000000"/>
-                </a:solidFill>
-                <a:effectLst/>
-                <a:latin typeface="Consolas" panose="020B0609020204030204" pitchFamily="49" charset="0"/>
-              </a:rPr>
-              <a:t>f.write</a:t>
-            </a:r>
-            <a:r>
-              <a:rPr lang="en-US" b="0" dirty="0">
-                <a:solidFill>
-                  <a:srgbClr val="00877B"/>
-                </a:solidFill>
-                <a:effectLst/>
-                <a:latin typeface="Consolas" panose="020B0609020204030204" pitchFamily="49" charset="0"/>
-              </a:rPr>
-              <a:t>(</a:t>
-            </a:r>
-            <a:r>
-              <a:rPr lang="en-US" b="0" dirty="0">
-                <a:solidFill>
-                  <a:srgbClr val="000000"/>
-                </a:solidFill>
-                <a:effectLst/>
-                <a:latin typeface="Consolas" panose="020B0609020204030204" pitchFamily="49" charset="0"/>
-              </a:rPr>
-              <a:t>program</a:t>
-            </a:r>
-            <a:r>
-              <a:rPr lang="en-US" b="0" dirty="0">
-                <a:solidFill>
-                  <a:srgbClr val="00877B"/>
-                </a:solidFill>
-                <a:effectLst/>
-                <a:latin typeface="Consolas" panose="020B0609020204030204" pitchFamily="49" charset="0"/>
-              </a:rPr>
-              <a:t>)</a:t>
-            </a:r>
-            <a:endParaRPr lang="en-US" b="0" dirty="0">
-              <a:solidFill>
-                <a:srgbClr val="000000"/>
-              </a:solidFill>
-              <a:effectLst/>
-              <a:latin typeface="Consolas" panose="020B0609020204030204" pitchFamily="49" charset="0"/>
-            </a:endParaRPr>
-          </a:p>
-          <a:p>
-            <a:pPr marL="0" indent="0">
-              <a:buNone/>
-            </a:pPr>
-            <a:r>
-              <a:rPr lang="en-US" b="0" dirty="0">
-                <a:solidFill>
-                  <a:srgbClr val="000000"/>
-                </a:solidFill>
-                <a:effectLst/>
-                <a:latin typeface="Consolas" panose="020B0609020204030204" pitchFamily="49" charset="0"/>
-              </a:rPr>
-              <a:t>    </a:t>
-            </a:r>
-            <a:r>
-              <a:rPr lang="en-US" b="0" dirty="0">
-                <a:solidFill>
-                  <a:srgbClr val="0078CC"/>
-                </a:solidFill>
-                <a:effectLst/>
-                <a:latin typeface="Consolas" panose="020B0609020204030204" pitchFamily="49" charset="0"/>
-              </a:rPr>
-              <a:t>if</a:t>
-            </a:r>
-            <a:r>
-              <a:rPr lang="en-US" b="0" dirty="0">
-                <a:solidFill>
-                  <a:srgbClr val="000000"/>
-                </a:solidFill>
-                <a:effectLst/>
-                <a:latin typeface="Consolas" panose="020B0609020204030204" pitchFamily="49" charset="0"/>
-              </a:rPr>
-              <a:t> </a:t>
-            </a:r>
-            <a:r>
-              <a:rPr lang="en-US" b="0" dirty="0">
-                <a:solidFill>
-                  <a:srgbClr val="00877B"/>
-                </a:solidFill>
-                <a:effectLst/>
-                <a:latin typeface="Consolas" panose="020B0609020204030204" pitchFamily="49" charset="0"/>
-              </a:rPr>
-              <a:t>(</a:t>
-            </a:r>
-            <a:r>
-              <a:rPr lang="en-US" b="0" dirty="0">
-                <a:solidFill>
-                  <a:srgbClr val="D8009B"/>
-                </a:solidFill>
-                <a:effectLst/>
-                <a:latin typeface="Consolas" panose="020B0609020204030204" pitchFamily="49" charset="0"/>
-              </a:rPr>
-              <a:t>"</a:t>
-            </a:r>
-            <a:r>
-              <a:rPr lang="en-US" b="0" dirty="0" err="1">
-                <a:solidFill>
-                  <a:srgbClr val="D8009B"/>
-                </a:solidFill>
-                <a:effectLst/>
-                <a:latin typeface="Consolas" panose="020B0609020204030204" pitchFamily="49" charset="0"/>
-              </a:rPr>
-              <a:t>importFile</a:t>
-            </a:r>
-            <a:r>
-              <a:rPr lang="en-US" b="0" dirty="0">
-                <a:solidFill>
-                  <a:srgbClr val="D8009B"/>
-                </a:solidFill>
-                <a:effectLst/>
-                <a:latin typeface="Consolas" panose="020B0609020204030204" pitchFamily="49" charset="0"/>
-              </a:rPr>
-              <a:t>"</a:t>
-            </a:r>
-            <a:r>
-              <a:rPr lang="en-US" b="0" dirty="0">
-                <a:solidFill>
-                  <a:srgbClr val="000000"/>
-                </a:solidFill>
-                <a:effectLst/>
-                <a:latin typeface="Consolas" panose="020B0609020204030204" pitchFamily="49" charset="0"/>
-              </a:rPr>
-              <a:t> </a:t>
-            </a:r>
-            <a:r>
-              <a:rPr lang="en-US" b="0" dirty="0">
-                <a:solidFill>
-                  <a:srgbClr val="0078CC"/>
-                </a:solidFill>
-                <a:effectLst/>
-                <a:latin typeface="Consolas" panose="020B0609020204030204" pitchFamily="49" charset="0"/>
-              </a:rPr>
-              <a:t>in</a:t>
-            </a:r>
-            <a:r>
-              <a:rPr lang="en-US" b="0" dirty="0">
-                <a:solidFill>
-                  <a:srgbClr val="000000"/>
-                </a:solidFill>
-                <a:effectLst/>
-                <a:latin typeface="Consolas" panose="020B0609020204030204" pitchFamily="49" charset="0"/>
-              </a:rPr>
-              <a:t> </a:t>
-            </a:r>
-            <a:r>
-              <a:rPr lang="en-US" b="0" dirty="0" err="1">
-                <a:solidFill>
-                  <a:srgbClr val="000000"/>
-                </a:solidFill>
-                <a:effectLst/>
-                <a:latin typeface="Consolas" panose="020B0609020204030204" pitchFamily="49" charset="0"/>
-              </a:rPr>
-              <a:t>sys.modules</a:t>
-            </a:r>
-            <a:r>
-              <a:rPr lang="en-US" b="0" dirty="0">
-                <a:solidFill>
-                  <a:srgbClr val="00877B"/>
-                </a:solidFill>
-                <a:effectLst/>
-                <a:latin typeface="Consolas" panose="020B0609020204030204" pitchFamily="49" charset="0"/>
-              </a:rPr>
-              <a:t>)</a:t>
-            </a:r>
-            <a:r>
-              <a:rPr lang="en-US" b="0" dirty="0">
-                <a:solidFill>
-                  <a:srgbClr val="000000"/>
-                </a:solidFill>
-                <a:effectLst/>
-                <a:latin typeface="Consolas" panose="020B0609020204030204" pitchFamily="49" charset="0"/>
-              </a:rPr>
-              <a:t>:</a:t>
-            </a:r>
-          </a:p>
-          <a:p>
-            <a:pPr marL="0" indent="0">
-              <a:buNone/>
-            </a:pPr>
-            <a:r>
-              <a:rPr lang="en-US" b="0" dirty="0">
-                <a:solidFill>
-                  <a:srgbClr val="000000"/>
-                </a:solidFill>
-                <a:effectLst/>
-                <a:latin typeface="Consolas" panose="020B0609020204030204" pitchFamily="49" charset="0"/>
-              </a:rPr>
-              <a:t>        </a:t>
-            </a:r>
-            <a:r>
-              <a:rPr lang="en-US" b="0" dirty="0">
-                <a:solidFill>
-                  <a:srgbClr val="0078CC"/>
-                </a:solidFill>
-                <a:effectLst/>
-                <a:latin typeface="Consolas" panose="020B0609020204030204" pitchFamily="49" charset="0"/>
-              </a:rPr>
-              <a:t>del</a:t>
-            </a:r>
-            <a:r>
-              <a:rPr lang="en-US" b="0" dirty="0">
-                <a:solidFill>
-                  <a:srgbClr val="000000"/>
-                </a:solidFill>
-                <a:effectLst/>
-                <a:latin typeface="Consolas" panose="020B0609020204030204" pitchFamily="49" charset="0"/>
-              </a:rPr>
-              <a:t> </a:t>
-            </a:r>
-            <a:r>
-              <a:rPr lang="en-US" b="0" dirty="0" err="1">
-                <a:solidFill>
-                  <a:srgbClr val="000000"/>
-                </a:solidFill>
-                <a:effectLst/>
-                <a:latin typeface="Consolas" panose="020B0609020204030204" pitchFamily="49" charset="0"/>
-              </a:rPr>
-              <a:t>sys.modules</a:t>
-            </a:r>
-            <a:r>
-              <a:rPr lang="en-US" b="0" dirty="0">
-                <a:solidFill>
-                  <a:srgbClr val="00877B"/>
-                </a:solidFill>
-                <a:effectLst/>
-                <a:latin typeface="Consolas" panose="020B0609020204030204" pitchFamily="49" charset="0"/>
-              </a:rPr>
-              <a:t>[</a:t>
-            </a:r>
-            <a:r>
-              <a:rPr lang="en-US" b="0" dirty="0">
-                <a:solidFill>
-                  <a:srgbClr val="D8009B"/>
-                </a:solidFill>
-                <a:effectLst/>
-                <a:latin typeface="Consolas" panose="020B0609020204030204" pitchFamily="49" charset="0"/>
-              </a:rPr>
-              <a:t>"</a:t>
-            </a:r>
-            <a:r>
-              <a:rPr lang="en-US" b="0" dirty="0" err="1">
-                <a:solidFill>
-                  <a:srgbClr val="D8009B"/>
-                </a:solidFill>
-                <a:effectLst/>
-                <a:latin typeface="Consolas" panose="020B0609020204030204" pitchFamily="49" charset="0"/>
-              </a:rPr>
-              <a:t>importFile</a:t>
-            </a:r>
-            <a:r>
-              <a:rPr lang="en-US" b="0" dirty="0">
-                <a:solidFill>
-                  <a:srgbClr val="D8009B"/>
-                </a:solidFill>
-                <a:effectLst/>
-                <a:latin typeface="Consolas" panose="020B0609020204030204" pitchFamily="49" charset="0"/>
-              </a:rPr>
-              <a:t>"</a:t>
-            </a:r>
-            <a:r>
-              <a:rPr lang="en-US" b="0" dirty="0">
-                <a:solidFill>
-                  <a:srgbClr val="00877B"/>
-                </a:solidFill>
-                <a:effectLst/>
-                <a:latin typeface="Consolas" panose="020B0609020204030204" pitchFamily="49" charset="0"/>
-              </a:rPr>
-              <a:t>]</a:t>
-            </a:r>
-            <a:endParaRPr lang="en-US" b="0" dirty="0">
-              <a:solidFill>
-                <a:srgbClr val="000000"/>
-              </a:solidFill>
-              <a:effectLst/>
-              <a:latin typeface="Consolas" panose="020B0609020204030204" pitchFamily="49" charset="0"/>
-            </a:endParaRPr>
-          </a:p>
-          <a:p>
-            <a:pPr marL="0" indent="0">
-              <a:buNone/>
-            </a:pPr>
-            <a:r>
-              <a:rPr lang="en-US" b="0" dirty="0">
-                <a:solidFill>
-                  <a:srgbClr val="000000"/>
-                </a:solidFill>
-                <a:effectLst/>
-                <a:latin typeface="Consolas" panose="020B0609020204030204" pitchFamily="49" charset="0"/>
-              </a:rPr>
-              <a:t>    </a:t>
-            </a:r>
-            <a:r>
-              <a:rPr lang="en-US" b="0" dirty="0">
-                <a:solidFill>
-                  <a:srgbClr val="0078CC"/>
-                </a:solidFill>
-                <a:effectLst/>
-                <a:latin typeface="Consolas" panose="020B0609020204030204" pitchFamily="49" charset="0"/>
-              </a:rPr>
-              <a:t>exec</a:t>
-            </a:r>
-            <a:r>
-              <a:rPr lang="en-US" b="0" dirty="0">
-                <a:solidFill>
-                  <a:srgbClr val="00877B"/>
-                </a:solidFill>
-                <a:effectLst/>
-                <a:latin typeface="Consolas" panose="020B0609020204030204" pitchFamily="49" charset="0"/>
-              </a:rPr>
-              <a:t>(</a:t>
-            </a:r>
-            <a:r>
-              <a:rPr lang="en-US" b="0" dirty="0">
-                <a:solidFill>
-                  <a:srgbClr val="D8009B"/>
-                </a:solidFill>
-                <a:effectLst/>
-                <a:latin typeface="Consolas" panose="020B0609020204030204" pitchFamily="49" charset="0"/>
-              </a:rPr>
-              <a:t>"from </a:t>
-            </a:r>
-            <a:r>
-              <a:rPr lang="en-US" b="0" dirty="0" err="1">
-                <a:solidFill>
-                  <a:srgbClr val="D8009B"/>
-                </a:solidFill>
-                <a:effectLst/>
-                <a:latin typeface="Consolas" panose="020B0609020204030204" pitchFamily="49" charset="0"/>
-              </a:rPr>
-              <a:t>importFile</a:t>
-            </a:r>
-            <a:r>
-              <a:rPr lang="en-US" b="0" dirty="0">
-                <a:solidFill>
-                  <a:srgbClr val="D8009B"/>
-                </a:solidFill>
-                <a:effectLst/>
-                <a:latin typeface="Consolas" panose="020B0609020204030204" pitchFamily="49" charset="0"/>
-              </a:rPr>
-              <a:t> import *"</a:t>
-            </a:r>
-            <a:r>
-              <a:rPr lang="en-US" b="0" dirty="0">
-                <a:solidFill>
-                  <a:srgbClr val="00877B"/>
-                </a:solidFill>
-                <a:effectLst/>
-                <a:latin typeface="Consolas" panose="020B0609020204030204" pitchFamily="49" charset="0"/>
-              </a:rPr>
-              <a:t>)</a:t>
-            </a:r>
-            <a:endParaRPr lang="en-US" b="0" dirty="0">
-              <a:solidFill>
-                <a:srgbClr val="000000"/>
-              </a:solidFill>
-              <a:effectLst/>
-              <a:latin typeface="Consolas" panose="020B0609020204030204" pitchFamily="49" charset="0"/>
-            </a:endParaRPr>
-          </a:p>
-          <a:p>
-            <a:r>
-              <a:rPr lang="en-US" dirty="0">
-                <a:solidFill>
-                  <a:schemeClr val="tx1"/>
-                </a:solidFill>
-              </a:rPr>
-              <a:t>If you type </a:t>
-            </a:r>
-            <a:r>
-              <a:rPr lang="en-US" b="0" dirty="0" err="1">
-                <a:solidFill>
-                  <a:srgbClr val="000000"/>
-                </a:solidFill>
-                <a:effectLst/>
-                <a:latin typeface="Consolas" panose="020B0609020204030204" pitchFamily="49" charset="0"/>
-              </a:rPr>
-              <a:t>importFile</a:t>
-            </a:r>
-            <a:r>
-              <a:rPr lang="en-US" b="0" dirty="0">
-                <a:solidFill>
-                  <a:srgbClr val="00877B"/>
-                </a:solidFill>
-                <a:effectLst/>
-                <a:latin typeface="Consolas" panose="020B0609020204030204" pitchFamily="49" charset="0"/>
-              </a:rPr>
-              <a:t>(</a:t>
-            </a:r>
-            <a:r>
-              <a:rPr lang="en-US" b="0" dirty="0" err="1">
-                <a:solidFill>
-                  <a:srgbClr val="000000"/>
-                </a:solidFill>
-                <a:effectLst/>
-                <a:latin typeface="Consolas" panose="020B0609020204030204" pitchFamily="49" charset="0"/>
-              </a:rPr>
-              <a:t>slotid</a:t>
-            </a:r>
-            <a:r>
-              <a:rPr lang="en-US" b="0" dirty="0">
-                <a:solidFill>
-                  <a:srgbClr val="000000"/>
-                </a:solidFill>
-                <a:effectLst/>
-                <a:latin typeface="Consolas" panose="020B0609020204030204" pitchFamily="49" charset="0"/>
-              </a:rPr>
-              <a:t>=</a:t>
-            </a:r>
-            <a:r>
-              <a:rPr lang="en-US" b="0" dirty="0">
-                <a:solidFill>
-                  <a:srgbClr val="FF7D00"/>
-                </a:solidFill>
-                <a:effectLst/>
-                <a:latin typeface="Consolas" panose="020B0609020204030204" pitchFamily="49" charset="0"/>
-              </a:rPr>
-              <a:t>XXX</a:t>
-            </a:r>
-            <a:r>
-              <a:rPr lang="en-US" b="0" dirty="0">
-                <a:solidFill>
-                  <a:srgbClr val="00877B"/>
-                </a:solidFill>
-                <a:effectLst/>
-                <a:latin typeface="Consolas" panose="020B0609020204030204" pitchFamily="49" charset="0"/>
-              </a:rPr>
-              <a:t>)</a:t>
-            </a:r>
-            <a:r>
-              <a:rPr lang="en-US" dirty="0">
-                <a:solidFill>
-                  <a:srgbClr val="000000"/>
-                </a:solidFill>
-              </a:rPr>
-              <a:t> and type the slot that you saved the other project to, your functions from the other project will be imported into this project.</a:t>
-            </a:r>
-          </a:p>
-          <a:p>
-            <a:r>
-              <a:rPr lang="en-US" b="0" dirty="0">
-                <a:solidFill>
-                  <a:srgbClr val="000000"/>
-                </a:solidFill>
-                <a:effectLst/>
-              </a:rPr>
-              <a:t>If you try running </a:t>
-            </a:r>
-            <a:r>
-              <a:rPr lang="en-US" b="0" dirty="0">
-                <a:solidFill>
-                  <a:srgbClr val="000000"/>
-                </a:solidFill>
-                <a:effectLst/>
-                <a:latin typeface="Consolas" panose="020B0609020204030204" pitchFamily="49" charset="0"/>
-              </a:rPr>
-              <a:t>left</a:t>
-            </a:r>
-            <a:r>
-              <a:rPr lang="en-US" b="0" dirty="0">
-                <a:solidFill>
-                  <a:srgbClr val="00877B"/>
-                </a:solidFill>
-                <a:effectLst/>
-                <a:latin typeface="Consolas" panose="020B0609020204030204" pitchFamily="49" charset="0"/>
-              </a:rPr>
-              <a:t>() </a:t>
-            </a:r>
-            <a:r>
-              <a:rPr lang="en-US" b="0" dirty="0">
-                <a:solidFill>
-                  <a:schemeClr val="tx1"/>
-                </a:solidFill>
-                <a:effectLst/>
-                <a:latin typeface="+mj-lt"/>
-              </a:rPr>
-              <a:t>or </a:t>
-            </a:r>
-            <a:r>
-              <a:rPr lang="en-US" b="0" dirty="0">
-                <a:solidFill>
-                  <a:srgbClr val="000000"/>
-                </a:solidFill>
-                <a:effectLst/>
-                <a:latin typeface="Consolas" panose="020B0609020204030204" pitchFamily="49" charset="0"/>
-              </a:rPr>
-              <a:t>right</a:t>
-            </a:r>
-            <a:r>
-              <a:rPr lang="en-US" b="0" dirty="0">
-                <a:solidFill>
-                  <a:srgbClr val="00877B"/>
-                </a:solidFill>
-                <a:effectLst/>
-                <a:latin typeface="Consolas" panose="020B0609020204030204" pitchFamily="49" charset="0"/>
-              </a:rPr>
-              <a:t>()</a:t>
-            </a:r>
-            <a:r>
-              <a:rPr lang="en-US" b="0" dirty="0">
-                <a:solidFill>
-                  <a:schemeClr val="tx1"/>
-                </a:solidFill>
-                <a:effectLst/>
-              </a:rPr>
-              <a:t>, the code should work properly.</a:t>
-            </a:r>
-            <a:endParaRPr lang="en-US" b="0" dirty="0">
-              <a:solidFill>
-                <a:srgbClr val="000000"/>
-              </a:solidFill>
-              <a:effectLst/>
-              <a:latin typeface="Consolas" panose="020B0609020204030204" pitchFamily="49" charset="0"/>
-            </a:endParaRPr>
-          </a:p>
         </p:txBody>
       </p:sp>
       <p:sp>
@@ -11902,8 +12104,8 @@
           <a:lstStyle/>
           <a:p>
             <a:r>
-              <a:rPr lang="en-GB"/>
-              <a:t>Copyright © 2021 Prime Lessons (primelessons.org) CC-BY-NC-SA.  (Last edit: 01/17/2021)</a:t>
+              <a:rPr lang="en-US"/>
+              <a:t>Copyright © 2021 Prime Lessons (primelessons.org) CC-BY-NC-SA.  (Last edit: 08/07/2021)</a:t>
             </a:r>
             <a:endParaRPr lang="en-US" dirty="0"/>
           </a:p>
@@ -11952,7 +12154,7 @@
         </p:nvSpPr>
         <p:spPr>
           <a:xfrm>
-            <a:off x="1927410" y="1629472"/>
+            <a:off x="2119957" y="1795406"/>
             <a:ext cx="6454589" cy="338554"/>
           </a:xfrm>
           <a:prstGeom prst="rect">
@@ -12007,7 +12209,7 @@
         </p:nvSpPr>
         <p:spPr>
           <a:xfrm>
-            <a:off x="4345152" y="2062351"/>
+            <a:off x="4020474" y="2094780"/>
             <a:ext cx="3142326" cy="338554"/>
           </a:xfrm>
           <a:prstGeom prst="rect">
@@ -12046,7 +12248,7 @@
         </p:nvSpPr>
         <p:spPr>
           <a:xfrm>
-            <a:off x="2686383" y="2718766"/>
+            <a:off x="2791314" y="2776665"/>
             <a:ext cx="5497901" cy="338554"/>
           </a:xfrm>
           <a:prstGeom prst="rect">
@@ -12124,7 +12326,7 @@
         </p:nvSpPr>
         <p:spPr>
           <a:xfrm>
-            <a:off x="4095864" y="4297526"/>
+            <a:off x="4020474" y="4009006"/>
             <a:ext cx="3640901" cy="338554"/>
           </a:xfrm>
           <a:prstGeom prst="rect">
@@ -12163,7 +12365,7 @@
         </p:nvSpPr>
         <p:spPr>
           <a:xfrm>
-            <a:off x="3885300" y="4921512"/>
+            <a:off x="3712913" y="4732137"/>
             <a:ext cx="3974710" cy="338554"/>
           </a:xfrm>
           <a:prstGeom prst="rect">
@@ -12202,7 +12404,7 @@
         </p:nvSpPr>
         <p:spPr>
           <a:xfrm>
-            <a:off x="3885300" y="5206944"/>
+            <a:off x="3712913" y="4995739"/>
             <a:ext cx="1461952" cy="338554"/>
           </a:xfrm>
           <a:prstGeom prst="rect">
@@ -12338,8 +12540,8 @@
           <a:lstStyle/>
           <a:p>
             <a:r>
-              <a:rPr lang="en-GB"/>
-              <a:t>Copyright © 2021 Prime Lessons (primelessons.org) CC-BY-NC-SA.  (Last edit: 01/17/2021)</a:t>
+              <a:rPr lang="en-US"/>
+              <a:t>Copyright © 2021 Prime Lessons (primelessons.org) CC-BY-NC-SA.  (Last edit: 08/07/2021)</a:t>
             </a:r>
             <a:endParaRPr lang="en-US" dirty="0"/>
           </a:p>
@@ -12399,7 +12601,7 @@
           <a:effectLst/>
           <a:extLst>
             <a:ext uri="{91240B29-F687-4f45-9708-019B960494DF}">
-              <a14:hiddenLine xmlns:a14="http://schemas.microsoft.com/office/drawing/2010/main" xmlns="" w="9525">
+              <a14:hiddenLine xmlns="" xmlns:a14="http://schemas.microsoft.com/office/drawing/2010/main" w="9525">
                 <a:solidFill>
                   <a:schemeClr val="tx1"/>
                 </a:solidFill>
@@ -12409,7 +12611,7 @@
               </a14:hiddenLine>
             </a:ext>
             <a:ext uri="{AF507438-7753-43e0-B8FC-AC1667EBCBE1}">
-              <a14:hiddenEffects xmlns:a14="http://schemas.microsoft.com/office/drawing/2010/main" xmlns="">
+              <a14:hiddenEffects xmlns="" xmlns:a14="http://schemas.microsoft.com/office/drawing/2010/main">
                 <a:effectLst>
                   <a:outerShdw dist="35921" dir="2700000" algn="ctr" rotWithShape="0">
                     <a:schemeClr val="bg2"/>
@@ -12750,7 +12952,7 @@
           <a:noFill/>
           <a:extLst>
             <a:ext uri="{909E8E84-426E-40dd-AFC4-6F175D3DCCD1}">
-              <a14:hiddenFill xmlns:a14="http://schemas.microsoft.com/office/drawing/2010/main" xmlns="">
+              <a14:hiddenFill xmlns="" xmlns:a14="http://schemas.microsoft.com/office/drawing/2010/main">
                 <a:solidFill>
                   <a:srgbClr val="FFFFFF"/>
                 </a:solidFill>

</xml_diff>